<commit_message>
pbl changes in proposed sytem and problem description
</commit_message>
<xml_diff>
--- a/PBL_PROJECT_FINAL.pptx
+++ b/PBL_PROJECT_FINAL.pptx
@@ -226,7 +226,7 @@
             <a:fld id="{332DA3EE-D654-4F9A-88A6-879917C71670}" type="datetimeFigureOut">
               <a:rPr lang="en-US" smtClean="0"/>
               <a:pPr/>
-              <a:t>5/1/2022</a:t>
+              <a:t>5/3/2022</a:t>
             </a:fld>
             <a:endParaRPr lang="en-US"/>
           </a:p>
@@ -401,7 +401,7 @@
             <a:fld id="{F278CB5B-F3CE-4FE9-9D28-2B934D73C3D6}" type="datetimeFigureOut">
               <a:rPr lang="en-US" smtClean="0"/>
               <a:pPr/>
-              <a:t>5/1/2022</a:t>
+              <a:t>5/3/2022</a:t>
             </a:fld>
             <a:endParaRPr lang="en-US" dirty="0"/>
           </a:p>
@@ -1700,7 +1700,7 @@
             <a:fld id="{10584F5C-4138-4343-93C5-0A76D68DA832}" type="datetime1">
               <a:rPr lang="en-US" smtClean="0"/>
               <a:pPr/>
-              <a:t>5/1/2022</a:t>
+              <a:t>5/3/2022</a:t>
             </a:fld>
             <a:endParaRPr lang="en-US" dirty="0"/>
           </a:p>
@@ -1896,7 +1896,7 @@
             <a:fld id="{7043F687-6054-4761-B0E2-16F499847317}" type="datetime1">
               <a:rPr lang="en-US" smtClean="0"/>
               <a:pPr/>
-              <a:t>5/1/2022</a:t>
+              <a:t>5/3/2022</a:t>
             </a:fld>
             <a:endParaRPr lang="en-US" dirty="0"/>
           </a:p>
@@ -2086,7 +2086,7 @@
             <a:fld id="{69137519-BE30-46D8-B560-1D46F1068F1A}" type="datetime1">
               <a:rPr lang="en-US" smtClean="0"/>
               <a:pPr/>
-              <a:t>5/1/2022</a:t>
+              <a:t>5/3/2022</a:t>
             </a:fld>
             <a:endParaRPr lang="en-US" dirty="0"/>
           </a:p>
@@ -2652,7 +2652,7 @@
             <a:fld id="{397EC67F-B312-45BF-8EBA-3BFE3C676468}" type="datetime1">
               <a:rPr lang="en-US" smtClean="0"/>
               <a:pPr/>
-              <a:t>5/1/2022</a:t>
+              <a:t>5/3/2022</a:t>
             </a:fld>
             <a:endParaRPr lang="en-US" dirty="0"/>
           </a:p>
@@ -3221,7 +3221,7 @@
             <a:fld id="{8FF100CC-2628-4FCA-852E-B9F2891AA2DE}" type="datetime1">
               <a:rPr lang="en-US" smtClean="0"/>
               <a:pPr/>
-              <a:t>5/1/2022</a:t>
+              <a:t>5/3/2022</a:t>
             </a:fld>
             <a:endParaRPr lang="en-US" dirty="0"/>
           </a:p>
@@ -3543,7 +3543,7 @@
             <a:fld id="{F0E7EDD7-8317-4AB7-BF35-0B87B1769DC5}" type="datetime1">
               <a:rPr lang="en-US" smtClean="0"/>
               <a:pPr/>
-              <a:t>5/1/2022</a:t>
+              <a:t>5/3/2022</a:t>
             </a:fld>
             <a:endParaRPr lang="en-IN"/>
           </a:p>
@@ -3718,7 +3718,7 @@
             <a:fld id="{37617CD7-EF94-4689-A2B0-2E7BD8C091A1}" type="datetime1">
               <a:rPr lang="en-US" smtClean="0"/>
               <a:pPr/>
-              <a:t>5/1/2022</a:t>
+              <a:t>5/3/2022</a:t>
             </a:fld>
             <a:endParaRPr lang="en-IN"/>
           </a:p>
@@ -3969,7 +3969,7 @@
             <a:fld id="{71AA873C-1C42-458A-B3B6-E59C060D775B}" type="datetime1">
               <a:rPr lang="en-US" smtClean="0"/>
               <a:pPr/>
-              <a:t>5/1/2022</a:t>
+              <a:t>5/3/2022</a:t>
             </a:fld>
             <a:endParaRPr lang="en-IN"/>
           </a:p>
@@ -4206,7 +4206,7 @@
             <a:fld id="{084A5AEB-314C-474A-9003-54A39EF0BFDB}" type="datetime1">
               <a:rPr lang="en-US" smtClean="0"/>
               <a:pPr/>
-              <a:t>5/1/2022</a:t>
+              <a:t>5/3/2022</a:t>
             </a:fld>
             <a:endParaRPr lang="en-IN"/>
           </a:p>
@@ -4578,7 +4578,7 @@
             <a:fld id="{28D12269-6F6F-4844-97A1-1F18EF393900}" type="datetime1">
               <a:rPr lang="en-US" smtClean="0"/>
               <a:pPr/>
-              <a:t>5/1/2022</a:t>
+              <a:t>5/3/2022</a:t>
             </a:fld>
             <a:endParaRPr lang="en-IN"/>
           </a:p>
@@ -4701,7 +4701,7 @@
             <a:fld id="{0E98BCC2-C6F7-42F5-9CDF-AB16E7422C71}" type="datetime1">
               <a:rPr lang="en-US" smtClean="0"/>
               <a:pPr/>
-              <a:t>5/1/2022</a:t>
+              <a:t>5/3/2022</a:t>
             </a:fld>
             <a:endParaRPr lang="en-IN"/>
           </a:p>
@@ -4890,7 +4890,7 @@
             <a:fld id="{E3F3D2C4-B264-461B-BA60-3413D14760D1}" type="datetime1">
               <a:rPr lang="en-US" smtClean="0"/>
               <a:pPr/>
-              <a:t>5/1/2022</a:t>
+              <a:t>5/3/2022</a:t>
             </a:fld>
             <a:endParaRPr lang="en-US" dirty="0"/>
           </a:p>
@@ -5055,7 +5055,7 @@
             <a:fld id="{FB35FDA6-6C5F-4E0F-85C9-0BD69F705BF1}" type="datetime1">
               <a:rPr lang="en-US" smtClean="0"/>
               <a:pPr/>
-              <a:t>5/1/2022</a:t>
+              <a:t>5/3/2022</a:t>
             </a:fld>
             <a:endParaRPr lang="en-IN"/>
           </a:p>
@@ -5337,7 +5337,7 @@
             <a:fld id="{31DDC787-FDF7-4154-BE1E-F0F6A5E710F3}" type="datetime1">
               <a:rPr lang="en-US" smtClean="0"/>
               <a:pPr/>
-              <a:t>5/1/2022</a:t>
+              <a:t>5/3/2022</a:t>
             </a:fld>
             <a:endParaRPr lang="en-IN"/>
           </a:p>
@@ -5595,7 +5595,7 @@
             <a:fld id="{4E1012BB-7191-4F82-8046-957AA9DABD49}" type="datetime1">
               <a:rPr lang="en-US" smtClean="0"/>
               <a:pPr/>
-              <a:t>5/1/2022</a:t>
+              <a:t>5/3/2022</a:t>
             </a:fld>
             <a:endParaRPr lang="en-IN"/>
           </a:p>
@@ -5770,7 +5770,7 @@
             <a:fld id="{B0C8E792-DEE8-4430-9E0C-D7E90FC0E117}" type="datetime1">
               <a:rPr lang="en-US" smtClean="0"/>
               <a:pPr/>
-              <a:t>5/1/2022</a:t>
+              <a:t>5/3/2022</a:t>
             </a:fld>
             <a:endParaRPr lang="en-IN"/>
           </a:p>
@@ -5955,7 +5955,7 @@
             <a:fld id="{0914688E-CA47-4402-B983-853973939A24}" type="datetime1">
               <a:rPr lang="en-US" smtClean="0"/>
               <a:pPr/>
-              <a:t>5/1/2022</a:t>
+              <a:t>5/3/2022</a:t>
             </a:fld>
             <a:endParaRPr lang="en-IN"/>
           </a:p>
@@ -6152,7 +6152,7 @@
             <a:fld id="{D0A58D4A-610F-4122-92FF-7E2622D960DF}" type="datetime1">
               <a:rPr lang="en-US" smtClean="0"/>
               <a:pPr/>
-              <a:t>5/1/2022</a:t>
+              <a:t>5/3/2022</a:t>
             </a:fld>
             <a:endParaRPr lang="en-IN"/>
           </a:p>
@@ -6327,7 +6327,7 @@
             <a:fld id="{939B0815-2E77-4E24-9554-61629A781DE0}" type="datetime1">
               <a:rPr lang="en-US" smtClean="0"/>
               <a:pPr/>
-              <a:t>5/1/2022</a:t>
+              <a:t>5/3/2022</a:t>
             </a:fld>
             <a:endParaRPr lang="en-IN"/>
           </a:p>
@@ -6578,7 +6578,7 @@
             <a:fld id="{F6B95B5E-DA6D-4907-83B3-5841D124DDEA}" type="datetime1">
               <a:rPr lang="en-US" smtClean="0"/>
               <a:pPr/>
-              <a:t>5/1/2022</a:t>
+              <a:t>5/3/2022</a:t>
             </a:fld>
             <a:endParaRPr lang="en-IN"/>
           </a:p>
@@ -6815,7 +6815,7 @@
             <a:fld id="{9407EBE1-8390-4F17-88EA-FF9185DC1AF7}" type="datetime1">
               <a:rPr lang="en-US" smtClean="0"/>
               <a:pPr/>
-              <a:t>5/1/2022</a:t>
+              <a:t>5/3/2022</a:t>
             </a:fld>
             <a:endParaRPr lang="en-IN"/>
           </a:p>
@@ -7187,7 +7187,7 @@
             <a:fld id="{EA498D89-525D-4622-879C-5FEE1DAF7D6B}" type="datetime1">
               <a:rPr lang="en-US" smtClean="0"/>
               <a:pPr/>
-              <a:t>5/1/2022</a:t>
+              <a:t>5/3/2022</a:t>
             </a:fld>
             <a:endParaRPr lang="en-IN"/>
           </a:p>
@@ -7547,7 +7547,7 @@
             <a:fld id="{E8744240-3047-4315-AA56-14891332084D}" type="datetime1">
               <a:rPr lang="en-US" smtClean="0"/>
               <a:pPr/>
-              <a:t>5/1/2022</a:t>
+              <a:t>5/3/2022</a:t>
             </a:fld>
             <a:endParaRPr lang="en-US" dirty="0"/>
           </a:p>
@@ -7681,7 +7681,7 @@
             <a:fld id="{DA8583DF-A4FF-47F9-A51E-3E4F38485EEA}" type="datetime1">
               <a:rPr lang="en-US" smtClean="0"/>
               <a:pPr/>
-              <a:t>5/1/2022</a:t>
+              <a:t>5/3/2022</a:t>
             </a:fld>
             <a:endParaRPr lang="en-IN"/>
           </a:p>
@@ -7781,7 +7781,7 @@
             <a:fld id="{3006FCBF-C042-43E0-8432-5506E43FED44}" type="datetime1">
               <a:rPr lang="en-US" smtClean="0"/>
               <a:pPr/>
-              <a:t>5/1/2022</a:t>
+              <a:t>5/3/2022</a:t>
             </a:fld>
             <a:endParaRPr lang="en-IN"/>
           </a:p>
@@ -8063,7 +8063,7 @@
             <a:fld id="{00797B92-834C-4D0A-9523-F44DD3F91E5A}" type="datetime1">
               <a:rPr lang="en-US" smtClean="0"/>
               <a:pPr/>
-              <a:t>5/1/2022</a:t>
+              <a:t>5/3/2022</a:t>
             </a:fld>
             <a:endParaRPr lang="en-IN"/>
           </a:p>
@@ -8321,7 +8321,7 @@
             <a:fld id="{B5681F9D-A23D-44D8-A9D9-D98A7D65F367}" type="datetime1">
               <a:rPr lang="en-US" smtClean="0"/>
               <a:pPr/>
-              <a:t>5/1/2022</a:t>
+              <a:t>5/3/2022</a:t>
             </a:fld>
             <a:endParaRPr lang="en-IN"/>
           </a:p>
@@ -8496,7 +8496,7 @@
             <a:fld id="{2F65FD45-0B78-4F6B-86DC-C980709345A1}" type="datetime1">
               <a:rPr lang="en-US" smtClean="0"/>
               <a:pPr/>
-              <a:t>5/1/2022</a:t>
+              <a:t>5/3/2022</a:t>
             </a:fld>
             <a:endParaRPr lang="en-IN"/>
           </a:p>
@@ -8681,7 +8681,7 @@
             <a:fld id="{526C3861-7385-4160-BC36-24D4FB3B8FA7}" type="datetime1">
               <a:rPr lang="en-US" smtClean="0"/>
               <a:pPr/>
-              <a:t>5/1/2022</a:t>
+              <a:t>5/3/2022</a:t>
             </a:fld>
             <a:endParaRPr lang="en-IN"/>
           </a:p>
@@ -8917,7 +8917,7 @@
             <a:fld id="{10796235-1DC1-4C5A-BDC4-D6F3C44B9858}" type="datetime1">
               <a:rPr lang="en-US" smtClean="0"/>
               <a:pPr/>
-              <a:t>5/1/2022</a:t>
+              <a:t>5/3/2022</a:t>
             </a:fld>
             <a:endParaRPr lang="en-US" dirty="0"/>
           </a:p>
@@ -9158,7 +9158,7 @@
             <a:fld id="{D3965C1E-479D-4552-B93A-ED01A5B1440F}" type="datetime1">
               <a:rPr lang="en-US" smtClean="0"/>
               <a:pPr/>
-              <a:t>5/1/2022</a:t>
+              <a:t>5/3/2022</a:t>
             </a:fld>
             <a:endParaRPr lang="en-US" dirty="0"/>
           </a:p>
@@ -9368,7 +9368,7 @@
             <a:fld id="{A1B88777-1028-4FBD-A500-A6F87F8D7DB8}" type="datetime1">
               <a:rPr lang="en-US" smtClean="0"/>
               <a:pPr/>
-              <a:t>5/1/2022</a:t>
+              <a:t>5/3/2022</a:t>
             </a:fld>
             <a:endParaRPr lang="en-US" dirty="0"/>
           </a:p>
@@ -9511,7 +9511,7 @@
             <a:fld id="{D2FF1AC1-DDE1-4B2C-AB3A-600197A159C3}" type="datetime1">
               <a:rPr lang="en-US" smtClean="0"/>
               <a:pPr/>
-              <a:t>5/1/2022</a:t>
+              <a:t>5/3/2022</a:t>
             </a:fld>
             <a:endParaRPr lang="en-US" dirty="0"/>
           </a:p>
@@ -9652,7 +9652,7 @@
             <a:fld id="{4DBB1CA7-EB32-4D19-9B10-85DE260AC6BE}" type="datetime1">
               <a:rPr lang="en-US" smtClean="0"/>
               <a:pPr/>
-              <a:t>5/1/2022</a:t>
+              <a:t>5/3/2022</a:t>
             </a:fld>
             <a:endParaRPr lang="en-US" dirty="0"/>
           </a:p>
@@ -10175,7 +10175,7 @@
             <a:fld id="{852CA255-7297-4248-9C5C-63039D04F3EF}" type="datetime1">
               <a:rPr lang="en-US" smtClean="0"/>
               <a:pPr/>
-              <a:t>5/1/2022</a:t>
+              <a:t>5/3/2022</a:t>
             </a:fld>
             <a:endParaRPr lang="en-US" dirty="0"/>
           </a:p>
@@ -10440,7 +10440,7 @@
             <a:fld id="{E88E5910-4132-4CC5-8FFF-E568F915E17D}" type="datetime1">
               <a:rPr lang="en-US" smtClean="0"/>
               <a:pPr/>
-              <a:t>5/1/2022</a:t>
+              <a:t>5/3/2022</a:t>
             </a:fld>
             <a:endParaRPr lang="en-US" dirty="0"/>
           </a:p>
@@ -11123,7 +11123,7 @@
             <a:fld id="{6C90E5CD-4670-46BC-B506-1DA4E882E822}" type="datetime1">
               <a:rPr lang="en-US" smtClean="0"/>
               <a:pPr/>
-              <a:t>5/1/2022</a:t>
+              <a:t>5/3/2022</a:t>
             </a:fld>
             <a:endParaRPr lang="en-IN" dirty="0"/>
           </a:p>
@@ -11669,7 +11669,7 @@
             <a:fld id="{43F89F02-4EB9-4739-ADF1-E7F46F5808AF}" type="datetime1">
               <a:rPr lang="en-US" smtClean="0"/>
               <a:pPr/>
-              <a:t>5/1/2022</a:t>
+              <a:t>5/3/2022</a:t>
             </a:fld>
             <a:endParaRPr lang="en-IN" dirty="0"/>
           </a:p>
@@ -15406,7 +15406,7 @@
         </p:spPr>
         <p:txBody>
           <a:bodyPr>
-            <a:normAutofit/>
+            <a:normAutofit fontScale="70000" lnSpcReduction="20000"/>
           </a:bodyPr>
           <a:lstStyle/>
           <a:p>
@@ -15414,7 +15414,7 @@
               <a:buNone/>
             </a:pPr>
             <a:r>
-              <a:rPr lang="en-US" altLang="ko-KR" sz="2000" b="1" dirty="0">
+              <a:rPr lang="en-US" altLang="ko-KR" sz="2300" b="1" dirty="0">
                 <a:latin typeface="Times New Roman" panose="02020603050405020304" pitchFamily="18" charset="0"/>
                 <a:ea typeface="굴림" charset="-127"/>
                 <a:cs typeface="Times New Roman" panose="02020603050405020304" pitchFamily="18" charset="0"/>
@@ -15427,7 +15427,7 @@
               <a:buNone/>
             </a:pPr>
             <a:r>
-              <a:rPr lang="en-IN" sz="2000" b="0" i="0" dirty="0">
+              <a:rPr lang="en-IN" sz="2900" b="0" i="0" dirty="0">
                 <a:solidFill>
                   <a:srgbClr val="000000"/>
                 </a:solidFill>
@@ -15435,14 +15435,126 @@
                 <a:latin typeface="Times New Roman" panose="02020603050405020304" pitchFamily="18" charset="0"/>
                 <a:cs typeface="Times New Roman" panose="02020603050405020304" pitchFamily="18" charset="0"/>
               </a:rPr>
-              <a:t>The central government’s afforestation scheme, Green India Mission (GIM), was able to only achieve 2.8 percent of its plantation target, according to the Economic Survey released by the Ministry of Finance on January 29, 2021.</a:t>
+              <a:t>The central government’s afforestation scheme, Green India Mission (</a:t>
+            </a:r>
+            <a:r>
+              <a:rPr lang="en-IN" sz="2900" b="0" i="0" dirty="0">
+                <a:solidFill>
+                  <a:srgbClr val="000000"/>
+                </a:solidFill>
+                <a:effectLst/>
+                <a:latin typeface="Times New Roman" panose="02020603050405020304" pitchFamily="18" charset="0"/>
+                <a:cs typeface="Times New Roman" panose="02020603050405020304" pitchFamily="18" charset="0"/>
+                <a:hlinkClick r:id="rId3"/>
+              </a:rPr>
+              <a:t>GIM</a:t>
+            </a:r>
+            <a:r>
+              <a:rPr lang="en-IN" sz="2900" b="0" i="0" dirty="0">
+                <a:solidFill>
+                  <a:srgbClr val="000000"/>
+                </a:solidFill>
+                <a:effectLst/>
+                <a:latin typeface="Times New Roman" panose="02020603050405020304" pitchFamily="18" charset="0"/>
+                <a:cs typeface="Times New Roman" panose="02020603050405020304" pitchFamily="18" charset="0"/>
+              </a:rPr>
+              <a:t>), was able to only achieve 2.8 percent of its plantation target, according to the Economic Survey released by the Ministry of Finance on January 29, 2021.</a:t>
             </a:r>
           </a:p>
           <a:p>
             <a:pPr marL="0" lvl="1" indent="0">
               <a:buNone/>
             </a:pPr>
-            <a:endParaRPr lang="en-US" altLang="ko-KR" sz="2000" b="1" dirty="0">
+            <a:endParaRPr lang="en-IN" sz="2300" b="0" i="0" dirty="0">
+              <a:solidFill>
+                <a:srgbClr val="000000"/>
+              </a:solidFill>
+              <a:effectLst/>
+              <a:latin typeface="Times New Roman" panose="02020603050405020304" pitchFamily="18" charset="0"/>
+              <a:cs typeface="Times New Roman" panose="02020603050405020304" pitchFamily="18" charset="0"/>
+            </a:endParaRPr>
+          </a:p>
+          <a:p>
+            <a:pPr marL="194310" indent="-514350">
+              <a:buFont typeface="Wingdings" panose="05000000000000000000" pitchFamily="2" charset="2"/>
+              <a:buChar char="ü"/>
+            </a:pPr>
+            <a:r>
+              <a:rPr lang="en-IN" dirty="0">
+                <a:latin typeface="Times New Roman" panose="02020603050405020304" pitchFamily="18" charset="0"/>
+                <a:cs typeface="Times New Roman" panose="02020603050405020304" pitchFamily="18" charset="0"/>
+              </a:rPr>
+              <a:t>Lack of Nutrients</a:t>
+            </a:r>
+          </a:p>
+          <a:p>
+            <a:pPr marL="137160" indent="-457200">
+              <a:buFont typeface="Wingdings" panose="05000000000000000000" pitchFamily="2" charset="2"/>
+              <a:buChar char="ü"/>
+            </a:pPr>
+            <a:r>
+              <a:rPr lang="en-IN" dirty="0">
+                <a:latin typeface="Times New Roman" panose="02020603050405020304" pitchFamily="18" charset="0"/>
+                <a:cs typeface="Times New Roman" panose="02020603050405020304" pitchFamily="18" charset="0"/>
+              </a:rPr>
+              <a:t>Pests</a:t>
+            </a:r>
+          </a:p>
+          <a:p>
+            <a:pPr marL="137160" indent="-457200">
+              <a:buFont typeface="Wingdings" panose="05000000000000000000" pitchFamily="2" charset="2"/>
+              <a:buChar char="ü"/>
+            </a:pPr>
+            <a:r>
+              <a:rPr lang="en-IN" dirty="0">
+                <a:latin typeface="Times New Roman" panose="02020603050405020304" pitchFamily="18" charset="0"/>
+                <a:cs typeface="Times New Roman" panose="02020603050405020304" pitchFamily="18" charset="0"/>
+              </a:rPr>
+              <a:t>Man-Made Damage</a:t>
+            </a:r>
+          </a:p>
+          <a:p>
+            <a:pPr marL="137160" indent="-457200">
+              <a:buFont typeface="Wingdings" panose="05000000000000000000" pitchFamily="2" charset="2"/>
+              <a:buChar char="ü"/>
+            </a:pPr>
+            <a:r>
+              <a:rPr lang="en-IN" dirty="0">
+                <a:solidFill>
+                  <a:srgbClr val="000000"/>
+                </a:solidFill>
+                <a:latin typeface="Times New Roman" panose="02020603050405020304" pitchFamily="18" charset="0"/>
+                <a:cs typeface="Times New Roman" panose="02020603050405020304" pitchFamily="18" charset="0"/>
+              </a:rPr>
+              <a:t>Lack of maintenance </a:t>
+            </a:r>
+            <a:endParaRPr lang="en-IN" i="0" dirty="0">
+              <a:solidFill>
+                <a:srgbClr val="000000"/>
+              </a:solidFill>
+              <a:effectLst/>
+              <a:latin typeface="Times New Roman" panose="02020603050405020304" pitchFamily="18" charset="0"/>
+              <a:cs typeface="Times New Roman" panose="02020603050405020304" pitchFamily="18" charset="0"/>
+            </a:endParaRPr>
+          </a:p>
+          <a:p>
+            <a:pPr marL="0" lvl="1" indent="0">
+              <a:buNone/>
+            </a:pPr>
+            <a:endParaRPr lang="en-IN" sz="2300" b="0" i="0" dirty="0">
+              <a:solidFill>
+                <a:srgbClr val="000000"/>
+              </a:solidFill>
+              <a:effectLst/>
+              <a:latin typeface="Times New Roman" panose="02020603050405020304" pitchFamily="18" charset="0"/>
+              <a:cs typeface="Times New Roman" panose="02020603050405020304" pitchFamily="18" charset="0"/>
+            </a:endParaRPr>
+          </a:p>
+          <a:p>
+            <a:pPr marL="0" lvl="1" indent="0">
+              <a:buNone/>
+            </a:pPr>
+            <a:endParaRPr lang="en-US" altLang="ko-KR" sz="2300" b="1" dirty="0">
               <a:latin typeface="Times New Roman" panose="02020603050405020304" pitchFamily="18" charset="0"/>
               <a:ea typeface="굴림" charset="-127"/>
               <a:cs typeface="Times New Roman" panose="02020603050405020304" pitchFamily="18" charset="0"/>
@@ -15453,7 +15565,7 @@
               <a:buNone/>
             </a:pPr>
             <a:r>
-              <a:rPr lang="en-US" altLang="ko-KR" sz="2000" b="1" dirty="0">
+              <a:rPr lang="en-US" altLang="ko-KR" sz="2900" b="1" dirty="0">
                 <a:latin typeface="Times New Roman" panose="02020603050405020304" pitchFamily="18" charset="0"/>
                 <a:ea typeface="굴림" charset="-127"/>
                 <a:cs typeface="Times New Roman" panose="02020603050405020304" pitchFamily="18" charset="0"/>
@@ -15466,14 +15578,14 @@
               <a:buNone/>
             </a:pPr>
             <a:r>
-              <a:rPr lang="en-US" sz="2000" dirty="0">
+              <a:rPr lang="en-US" dirty="0">
                 <a:latin typeface="Times New Roman" panose="02020603050405020304" pitchFamily="18" charset="0"/>
                 <a:cs typeface="Times New Roman" panose="02020603050405020304" pitchFamily="18" charset="0"/>
               </a:rPr>
-              <a:t>We provide a platform where anyone can plant or donate a tree and </a:t>
-            </a:r>
-            <a:r>
-              <a:rPr lang="en-US" altLang="ko-KR" sz="2000" dirty="0">
+              <a:t>We are providing a platform where anyone can plant or donate a tree and </a:t>
+            </a:r>
+            <a:r>
+              <a:rPr lang="en-US" altLang="ko-KR" dirty="0">
                 <a:latin typeface="Times New Roman" panose="02020603050405020304" pitchFamily="18" charset="0"/>
                 <a:ea typeface="굴림" charset="-127"/>
                 <a:cs typeface="Times New Roman" panose="02020603050405020304" pitchFamily="18" charset="0"/>
@@ -15502,7 +15614,7 @@
           <p:nvPr/>
         </p:nvPicPr>
         <p:blipFill>
-          <a:blip r:embed="rId3">
+          <a:blip r:embed="rId4">
             <a:extLst>
               <a:ext uri="{28A0092B-C50C-407E-A947-70E740481C1C}">
                 <a14:useLocalDpi xmlns:a14="http://schemas.microsoft.com/office/drawing/2010/main" val="0"/>
@@ -15545,36 +15657,6 @@
               </a14:hiddenLine>
             </a:ext>
           </a:extLst>
-        </p:spPr>
-      </p:pic>
-      <p:pic>
-        <p:nvPicPr>
-          <p:cNvPr id="10" name="Picture 9">
-            <a:extLst>
-              <a:ext uri="{FF2B5EF4-FFF2-40B4-BE49-F238E27FC236}">
-                <a16:creationId xmlns:a16="http://schemas.microsoft.com/office/drawing/2014/main" id="{0CA40A2C-C676-42B5-F022-0C65A5E5C48D}"/>
-              </a:ext>
-            </a:extLst>
-          </p:cNvPr>
-          <p:cNvPicPr>
-            <a:picLocks noChangeAspect="1"/>
-          </p:cNvPicPr>
-          <p:nvPr/>
-        </p:nvPicPr>
-        <p:blipFill>
-          <a:blip r:embed="rId4"/>
-          <a:stretch>
-            <a:fillRect/>
-          </a:stretch>
-        </p:blipFill>
-        <p:spPr>
-          <a:xfrm>
-            <a:off x="2483768" y="4743668"/>
-            <a:ext cx="3324225" cy="1971675"/>
-          </a:xfrm>
-          <a:prstGeom prst="rect">
-            <a:avLst/>
-          </a:prstGeom>
         </p:spPr>
       </p:pic>
     </p:spTree>
@@ -15693,21 +15775,30 @@
                             </p:childTnLst>
                           </p:cTn>
                         </p:par>
+                      </p:childTnLst>
+                    </p:cTn>
+                  </p:par>
+                  <p:par>
+                    <p:cTn id="9" fill="hold">
+                      <p:stCondLst>
+                        <p:cond delay="indefinite"/>
+                      </p:stCondLst>
+                      <p:childTnLst>
                         <p:par>
-                          <p:cTn id="9" fill="hold">
+                          <p:cTn id="10" fill="hold">
                             <p:stCondLst>
-                              <p:cond delay="500"/>
+                              <p:cond delay="0"/>
                             </p:stCondLst>
                             <p:childTnLst>
                               <p:par>
-                                <p:cTn id="10" presetID="2" presetClass="entr" presetSubtype="8" fill="hold" nodeType="afterEffect">
+                                <p:cTn id="11" presetID="2" presetClass="entr" presetSubtype="8" fill="hold" nodeType="clickEffect">
                                   <p:stCondLst>
                                     <p:cond delay="0"/>
                                   </p:stCondLst>
                                   <p:childTnLst>
                                     <p:set>
                                       <p:cBhvr>
-                                        <p:cTn id="11" dur="1" fill="hold">
+                                        <p:cTn id="12" dur="1" fill="hold">
                                           <p:stCondLst>
                                             <p:cond delay="0"/>
                                           </p:stCondLst>
@@ -15729,7 +15820,7 @@
                                     </p:set>
                                     <p:anim calcmode="lin" valueType="num">
                                       <p:cBhvr additive="base">
-                                        <p:cTn id="12" dur="500" fill="hold"/>
+                                        <p:cTn id="13" dur="500" fill="hold"/>
                                         <p:tgtEl>
                                           <p:spTgt spid="3">
                                             <p:txEl>
@@ -15756,7 +15847,7 @@
                                     </p:anim>
                                     <p:anim calcmode="lin" valueType="num">
                                       <p:cBhvr additive="base">
-                                        <p:cTn id="13" dur="500" fill="hold"/>
+                                        <p:cTn id="14" dur="500" fill="hold"/>
                                         <p:tgtEl>
                                           <p:spTgt spid="3">
                                             <p:txEl>
@@ -15791,26 +15882,26 @@
                     </p:cTn>
                   </p:par>
                   <p:par>
-                    <p:cTn id="14" fill="hold">
+                    <p:cTn id="15" fill="hold">
                       <p:stCondLst>
                         <p:cond delay="indefinite"/>
                       </p:stCondLst>
                       <p:childTnLst>
                         <p:par>
-                          <p:cTn id="15" fill="hold">
+                          <p:cTn id="16" fill="hold">
                             <p:stCondLst>
                               <p:cond delay="0"/>
                             </p:stCondLst>
                             <p:childTnLst>
                               <p:par>
-                                <p:cTn id="16" presetID="2" presetClass="entr" presetSubtype="4" fill="hold" nodeType="clickEffect">
+                                <p:cTn id="17" presetID="2" presetClass="entr" presetSubtype="8" fill="hold" nodeType="clickEffect">
                                   <p:stCondLst>
                                     <p:cond delay="0"/>
                                   </p:stCondLst>
                                   <p:childTnLst>
                                     <p:set>
                                       <p:cBhvr>
-                                        <p:cTn id="17" dur="1" fill="hold">
+                                        <p:cTn id="18" dur="1" fill="hold">
                                           <p:stCondLst>
                                             <p:cond delay="0"/>
                                           </p:stCondLst>
@@ -15832,11 +15923,423 @@
                                     </p:set>
                                     <p:anim calcmode="lin" valueType="num">
                                       <p:cBhvr additive="base">
-                                        <p:cTn id="18" dur="500" fill="hold"/>
+                                        <p:cTn id="19" dur="500" fill="hold"/>
                                         <p:tgtEl>
                                           <p:spTgt spid="3">
                                             <p:txEl>
                                               <p:pRg st="3" end="3"/>
+                                            </p:txEl>
+                                          </p:spTgt>
+                                        </p:tgtEl>
+                                        <p:attrNameLst>
+                                          <p:attrName>ppt_x</p:attrName>
+                                        </p:attrNameLst>
+                                      </p:cBhvr>
+                                      <p:tavLst>
+                                        <p:tav tm="0">
+                                          <p:val>
+                                            <p:strVal val="0-#ppt_w/2"/>
+                                          </p:val>
+                                        </p:tav>
+                                        <p:tav tm="100000">
+                                          <p:val>
+                                            <p:strVal val="#ppt_x"/>
+                                          </p:val>
+                                        </p:tav>
+                                      </p:tavLst>
+                                    </p:anim>
+                                    <p:anim calcmode="lin" valueType="num">
+                                      <p:cBhvr additive="base">
+                                        <p:cTn id="20" dur="500" fill="hold"/>
+                                        <p:tgtEl>
+                                          <p:spTgt spid="3">
+                                            <p:txEl>
+                                              <p:pRg st="3" end="3"/>
+                                            </p:txEl>
+                                          </p:spTgt>
+                                        </p:tgtEl>
+                                        <p:attrNameLst>
+                                          <p:attrName>ppt_y</p:attrName>
+                                        </p:attrNameLst>
+                                      </p:cBhvr>
+                                      <p:tavLst>
+                                        <p:tav tm="0">
+                                          <p:val>
+                                            <p:strVal val="#ppt_y"/>
+                                          </p:val>
+                                        </p:tav>
+                                        <p:tav tm="100000">
+                                          <p:val>
+                                            <p:strVal val="#ppt_y"/>
+                                          </p:val>
+                                        </p:tav>
+                                      </p:tavLst>
+                                    </p:anim>
+                                  </p:childTnLst>
+                                </p:cTn>
+                              </p:par>
+                            </p:childTnLst>
+                          </p:cTn>
+                        </p:par>
+                      </p:childTnLst>
+                    </p:cTn>
+                  </p:par>
+                  <p:par>
+                    <p:cTn id="21" fill="hold">
+                      <p:stCondLst>
+                        <p:cond delay="indefinite"/>
+                      </p:stCondLst>
+                      <p:childTnLst>
+                        <p:par>
+                          <p:cTn id="22" fill="hold">
+                            <p:stCondLst>
+                              <p:cond delay="0"/>
+                            </p:stCondLst>
+                            <p:childTnLst>
+                              <p:par>
+                                <p:cTn id="23" presetID="2" presetClass="entr" presetSubtype="8" fill="hold" nodeType="clickEffect">
+                                  <p:stCondLst>
+                                    <p:cond delay="0"/>
+                                  </p:stCondLst>
+                                  <p:childTnLst>
+                                    <p:set>
+                                      <p:cBhvr>
+                                        <p:cTn id="24" dur="1" fill="hold">
+                                          <p:stCondLst>
+                                            <p:cond delay="0"/>
+                                          </p:stCondLst>
+                                        </p:cTn>
+                                        <p:tgtEl>
+                                          <p:spTgt spid="3">
+                                            <p:txEl>
+                                              <p:pRg st="4" end="4"/>
+                                            </p:txEl>
+                                          </p:spTgt>
+                                        </p:tgtEl>
+                                        <p:attrNameLst>
+                                          <p:attrName>style.visibility</p:attrName>
+                                        </p:attrNameLst>
+                                      </p:cBhvr>
+                                      <p:to>
+                                        <p:strVal val="visible"/>
+                                      </p:to>
+                                    </p:set>
+                                    <p:anim calcmode="lin" valueType="num">
+                                      <p:cBhvr additive="base">
+                                        <p:cTn id="25" dur="500" fill="hold"/>
+                                        <p:tgtEl>
+                                          <p:spTgt spid="3">
+                                            <p:txEl>
+                                              <p:pRg st="4" end="4"/>
+                                            </p:txEl>
+                                          </p:spTgt>
+                                        </p:tgtEl>
+                                        <p:attrNameLst>
+                                          <p:attrName>ppt_x</p:attrName>
+                                        </p:attrNameLst>
+                                      </p:cBhvr>
+                                      <p:tavLst>
+                                        <p:tav tm="0">
+                                          <p:val>
+                                            <p:strVal val="0-#ppt_w/2"/>
+                                          </p:val>
+                                        </p:tav>
+                                        <p:tav tm="100000">
+                                          <p:val>
+                                            <p:strVal val="#ppt_x"/>
+                                          </p:val>
+                                        </p:tav>
+                                      </p:tavLst>
+                                    </p:anim>
+                                    <p:anim calcmode="lin" valueType="num">
+                                      <p:cBhvr additive="base">
+                                        <p:cTn id="26" dur="500" fill="hold"/>
+                                        <p:tgtEl>
+                                          <p:spTgt spid="3">
+                                            <p:txEl>
+                                              <p:pRg st="4" end="4"/>
+                                            </p:txEl>
+                                          </p:spTgt>
+                                        </p:tgtEl>
+                                        <p:attrNameLst>
+                                          <p:attrName>ppt_y</p:attrName>
+                                        </p:attrNameLst>
+                                      </p:cBhvr>
+                                      <p:tavLst>
+                                        <p:tav tm="0">
+                                          <p:val>
+                                            <p:strVal val="#ppt_y"/>
+                                          </p:val>
+                                        </p:tav>
+                                        <p:tav tm="100000">
+                                          <p:val>
+                                            <p:strVal val="#ppt_y"/>
+                                          </p:val>
+                                        </p:tav>
+                                      </p:tavLst>
+                                    </p:anim>
+                                  </p:childTnLst>
+                                </p:cTn>
+                              </p:par>
+                            </p:childTnLst>
+                          </p:cTn>
+                        </p:par>
+                      </p:childTnLst>
+                    </p:cTn>
+                  </p:par>
+                  <p:par>
+                    <p:cTn id="27" fill="hold">
+                      <p:stCondLst>
+                        <p:cond delay="indefinite"/>
+                      </p:stCondLst>
+                      <p:childTnLst>
+                        <p:par>
+                          <p:cTn id="28" fill="hold">
+                            <p:stCondLst>
+                              <p:cond delay="0"/>
+                            </p:stCondLst>
+                            <p:childTnLst>
+                              <p:par>
+                                <p:cTn id="29" presetID="2" presetClass="entr" presetSubtype="8" fill="hold" nodeType="clickEffect">
+                                  <p:stCondLst>
+                                    <p:cond delay="0"/>
+                                  </p:stCondLst>
+                                  <p:childTnLst>
+                                    <p:set>
+                                      <p:cBhvr>
+                                        <p:cTn id="30" dur="1" fill="hold">
+                                          <p:stCondLst>
+                                            <p:cond delay="0"/>
+                                          </p:stCondLst>
+                                        </p:cTn>
+                                        <p:tgtEl>
+                                          <p:spTgt spid="3">
+                                            <p:txEl>
+                                              <p:pRg st="5" end="5"/>
+                                            </p:txEl>
+                                          </p:spTgt>
+                                        </p:tgtEl>
+                                        <p:attrNameLst>
+                                          <p:attrName>style.visibility</p:attrName>
+                                        </p:attrNameLst>
+                                      </p:cBhvr>
+                                      <p:to>
+                                        <p:strVal val="visible"/>
+                                      </p:to>
+                                    </p:set>
+                                    <p:anim calcmode="lin" valueType="num">
+                                      <p:cBhvr additive="base">
+                                        <p:cTn id="31" dur="500" fill="hold"/>
+                                        <p:tgtEl>
+                                          <p:spTgt spid="3">
+                                            <p:txEl>
+                                              <p:pRg st="5" end="5"/>
+                                            </p:txEl>
+                                          </p:spTgt>
+                                        </p:tgtEl>
+                                        <p:attrNameLst>
+                                          <p:attrName>ppt_x</p:attrName>
+                                        </p:attrNameLst>
+                                      </p:cBhvr>
+                                      <p:tavLst>
+                                        <p:tav tm="0">
+                                          <p:val>
+                                            <p:strVal val="0-#ppt_w/2"/>
+                                          </p:val>
+                                        </p:tav>
+                                        <p:tav tm="100000">
+                                          <p:val>
+                                            <p:strVal val="#ppt_x"/>
+                                          </p:val>
+                                        </p:tav>
+                                      </p:tavLst>
+                                    </p:anim>
+                                    <p:anim calcmode="lin" valueType="num">
+                                      <p:cBhvr additive="base">
+                                        <p:cTn id="32" dur="500" fill="hold"/>
+                                        <p:tgtEl>
+                                          <p:spTgt spid="3">
+                                            <p:txEl>
+                                              <p:pRg st="5" end="5"/>
+                                            </p:txEl>
+                                          </p:spTgt>
+                                        </p:tgtEl>
+                                        <p:attrNameLst>
+                                          <p:attrName>ppt_y</p:attrName>
+                                        </p:attrNameLst>
+                                      </p:cBhvr>
+                                      <p:tavLst>
+                                        <p:tav tm="0">
+                                          <p:val>
+                                            <p:strVal val="#ppt_y"/>
+                                          </p:val>
+                                        </p:tav>
+                                        <p:tav tm="100000">
+                                          <p:val>
+                                            <p:strVal val="#ppt_y"/>
+                                          </p:val>
+                                        </p:tav>
+                                      </p:tavLst>
+                                    </p:anim>
+                                  </p:childTnLst>
+                                </p:cTn>
+                              </p:par>
+                            </p:childTnLst>
+                          </p:cTn>
+                        </p:par>
+                      </p:childTnLst>
+                    </p:cTn>
+                  </p:par>
+                  <p:par>
+                    <p:cTn id="33" fill="hold">
+                      <p:stCondLst>
+                        <p:cond delay="indefinite"/>
+                      </p:stCondLst>
+                      <p:childTnLst>
+                        <p:par>
+                          <p:cTn id="34" fill="hold">
+                            <p:stCondLst>
+                              <p:cond delay="0"/>
+                            </p:stCondLst>
+                            <p:childTnLst>
+                              <p:par>
+                                <p:cTn id="35" presetID="2" presetClass="entr" presetSubtype="8" fill="hold" nodeType="clickEffect">
+                                  <p:stCondLst>
+                                    <p:cond delay="0"/>
+                                  </p:stCondLst>
+                                  <p:childTnLst>
+                                    <p:set>
+                                      <p:cBhvr>
+                                        <p:cTn id="36" dur="1" fill="hold">
+                                          <p:stCondLst>
+                                            <p:cond delay="0"/>
+                                          </p:stCondLst>
+                                        </p:cTn>
+                                        <p:tgtEl>
+                                          <p:spTgt spid="3">
+                                            <p:txEl>
+                                              <p:pRg st="6" end="6"/>
+                                            </p:txEl>
+                                          </p:spTgt>
+                                        </p:tgtEl>
+                                        <p:attrNameLst>
+                                          <p:attrName>style.visibility</p:attrName>
+                                        </p:attrNameLst>
+                                      </p:cBhvr>
+                                      <p:to>
+                                        <p:strVal val="visible"/>
+                                      </p:to>
+                                    </p:set>
+                                    <p:anim calcmode="lin" valueType="num">
+                                      <p:cBhvr additive="base">
+                                        <p:cTn id="37" dur="500" fill="hold"/>
+                                        <p:tgtEl>
+                                          <p:spTgt spid="3">
+                                            <p:txEl>
+                                              <p:pRg st="6" end="6"/>
+                                            </p:txEl>
+                                          </p:spTgt>
+                                        </p:tgtEl>
+                                        <p:attrNameLst>
+                                          <p:attrName>ppt_x</p:attrName>
+                                        </p:attrNameLst>
+                                      </p:cBhvr>
+                                      <p:tavLst>
+                                        <p:tav tm="0">
+                                          <p:val>
+                                            <p:strVal val="0-#ppt_w/2"/>
+                                          </p:val>
+                                        </p:tav>
+                                        <p:tav tm="100000">
+                                          <p:val>
+                                            <p:strVal val="#ppt_x"/>
+                                          </p:val>
+                                        </p:tav>
+                                      </p:tavLst>
+                                    </p:anim>
+                                    <p:anim calcmode="lin" valueType="num">
+                                      <p:cBhvr additive="base">
+                                        <p:cTn id="38" dur="500" fill="hold"/>
+                                        <p:tgtEl>
+                                          <p:spTgt spid="3">
+                                            <p:txEl>
+                                              <p:pRg st="6" end="6"/>
+                                            </p:txEl>
+                                          </p:spTgt>
+                                        </p:tgtEl>
+                                        <p:attrNameLst>
+                                          <p:attrName>ppt_y</p:attrName>
+                                        </p:attrNameLst>
+                                      </p:cBhvr>
+                                      <p:tavLst>
+                                        <p:tav tm="0">
+                                          <p:val>
+                                            <p:strVal val="#ppt_y"/>
+                                          </p:val>
+                                        </p:tav>
+                                        <p:tav tm="100000">
+                                          <p:val>
+                                            <p:strVal val="#ppt_y"/>
+                                          </p:val>
+                                        </p:tav>
+                                      </p:tavLst>
+                                    </p:anim>
+                                  </p:childTnLst>
+                                </p:cTn>
+                              </p:par>
+                            </p:childTnLst>
+                          </p:cTn>
+                        </p:par>
+                      </p:childTnLst>
+                    </p:cTn>
+                  </p:par>
+                  <p:par>
+                    <p:cTn id="39" fill="hold">
+                      <p:stCondLst>
+                        <p:cond delay="indefinite"/>
+                      </p:stCondLst>
+                      <p:childTnLst>
+                        <p:par>
+                          <p:cTn id="40" fill="hold">
+                            <p:stCondLst>
+                              <p:cond delay="0"/>
+                            </p:stCondLst>
+                            <p:childTnLst>
+                              <p:par>
+                                <p:cTn id="41" presetID="2" presetClass="entr" presetSubtype="4" fill="hold" nodeType="clickEffect">
+                                  <p:stCondLst>
+                                    <p:cond delay="0"/>
+                                  </p:stCondLst>
+                                  <p:childTnLst>
+                                    <p:set>
+                                      <p:cBhvr>
+                                        <p:cTn id="42" dur="1" fill="hold">
+                                          <p:stCondLst>
+                                            <p:cond delay="0"/>
+                                          </p:stCondLst>
+                                        </p:cTn>
+                                        <p:tgtEl>
+                                          <p:spTgt spid="3">
+                                            <p:txEl>
+                                              <p:pRg st="9" end="9"/>
+                                            </p:txEl>
+                                          </p:spTgt>
+                                        </p:tgtEl>
+                                        <p:attrNameLst>
+                                          <p:attrName>style.visibility</p:attrName>
+                                        </p:attrNameLst>
+                                      </p:cBhvr>
+                                      <p:to>
+                                        <p:strVal val="visible"/>
+                                      </p:to>
+                                    </p:set>
+                                    <p:anim calcmode="lin" valueType="num">
+                                      <p:cBhvr additive="base">
+                                        <p:cTn id="43" dur="500" fill="hold"/>
+                                        <p:tgtEl>
+                                          <p:spTgt spid="3">
+                                            <p:txEl>
+                                              <p:pRg st="9" end="9"/>
                                             </p:txEl>
                                           </p:spTgt>
                                         </p:tgtEl>
@@ -15859,11 +16362,11 @@
                                     </p:anim>
                                     <p:anim calcmode="lin" valueType="num">
                                       <p:cBhvr additive="base">
-                                        <p:cTn id="19" dur="500" fill="hold"/>
+                                        <p:cTn id="44" dur="500" fill="hold"/>
                                         <p:tgtEl>
                                           <p:spTgt spid="3">
                                             <p:txEl>
-                                              <p:pRg st="3" end="3"/>
+                                              <p:pRg st="9" end="9"/>
                                             </p:txEl>
                                           </p:spTgt>
                                         </p:tgtEl>
@@ -15891,20 +16394,20 @@
                           </p:cTn>
                         </p:par>
                         <p:par>
-                          <p:cTn id="20" fill="hold">
+                          <p:cTn id="45" fill="hold">
                             <p:stCondLst>
                               <p:cond delay="500"/>
                             </p:stCondLst>
                             <p:childTnLst>
                               <p:par>
-                                <p:cTn id="21" presetID="2" presetClass="entr" presetSubtype="4" fill="hold" nodeType="afterEffect">
+                                <p:cTn id="46" presetID="2" presetClass="entr" presetSubtype="4" fill="hold" nodeType="afterEffect">
                                   <p:stCondLst>
                                     <p:cond delay="0"/>
                                   </p:stCondLst>
                                   <p:childTnLst>
                                     <p:set>
                                       <p:cBhvr>
-                                        <p:cTn id="22" dur="1" fill="hold">
+                                        <p:cTn id="47" dur="1" fill="hold">
                                           <p:stCondLst>
                                             <p:cond delay="0"/>
                                           </p:stCondLst>
@@ -15912,7 +16415,7 @@
                                         <p:tgtEl>
                                           <p:spTgt spid="3">
                                             <p:txEl>
-                                              <p:pRg st="4" end="4"/>
+                                              <p:pRg st="10" end="10"/>
                                             </p:txEl>
                                           </p:spTgt>
                                         </p:tgtEl>
@@ -15926,11 +16429,11 @@
                                     </p:set>
                                     <p:anim calcmode="lin" valueType="num">
                                       <p:cBhvr additive="base">
-                                        <p:cTn id="23" dur="500" fill="hold"/>
+                                        <p:cTn id="48" dur="500" fill="hold"/>
                                         <p:tgtEl>
                                           <p:spTgt spid="3">
                                             <p:txEl>
-                                              <p:pRg st="4" end="4"/>
+                                              <p:pRg st="10" end="10"/>
                                             </p:txEl>
                                           </p:spTgt>
                                         </p:tgtEl>
@@ -15953,95 +16456,13 @@
                                     </p:anim>
                                     <p:anim calcmode="lin" valueType="num">
                                       <p:cBhvr additive="base">
-                                        <p:cTn id="24" dur="500" fill="hold"/>
+                                        <p:cTn id="49" dur="500" fill="hold"/>
                                         <p:tgtEl>
                                           <p:spTgt spid="3">
                                             <p:txEl>
-                                              <p:pRg st="4" end="4"/>
+                                              <p:pRg st="10" end="10"/>
                                             </p:txEl>
                                           </p:spTgt>
-                                        </p:tgtEl>
-                                        <p:attrNameLst>
-                                          <p:attrName>ppt_y</p:attrName>
-                                        </p:attrNameLst>
-                                      </p:cBhvr>
-                                      <p:tavLst>
-                                        <p:tav tm="0">
-                                          <p:val>
-                                            <p:strVal val="1+#ppt_h/2"/>
-                                          </p:val>
-                                        </p:tav>
-                                        <p:tav tm="100000">
-                                          <p:val>
-                                            <p:strVal val="#ppt_y"/>
-                                          </p:val>
-                                        </p:tav>
-                                      </p:tavLst>
-                                    </p:anim>
-                                  </p:childTnLst>
-                                </p:cTn>
-                              </p:par>
-                            </p:childTnLst>
-                          </p:cTn>
-                        </p:par>
-                        <p:par>
-                          <p:cTn id="25" fill="hold">
-                            <p:stCondLst>
-                              <p:cond delay="1000"/>
-                            </p:stCondLst>
-                            <p:childTnLst>
-                              <p:par>
-                                <p:cTn id="26" presetID="2" presetClass="entr" presetSubtype="4" fill="hold" nodeType="afterEffect">
-                                  <p:stCondLst>
-                                    <p:cond delay="0"/>
-                                  </p:stCondLst>
-                                  <p:childTnLst>
-                                    <p:set>
-                                      <p:cBhvr>
-                                        <p:cTn id="27" dur="1" fill="hold">
-                                          <p:stCondLst>
-                                            <p:cond delay="0"/>
-                                          </p:stCondLst>
-                                        </p:cTn>
-                                        <p:tgtEl>
-                                          <p:spTgt spid="10"/>
-                                        </p:tgtEl>
-                                        <p:attrNameLst>
-                                          <p:attrName>style.visibility</p:attrName>
-                                        </p:attrNameLst>
-                                      </p:cBhvr>
-                                      <p:to>
-                                        <p:strVal val="visible"/>
-                                      </p:to>
-                                    </p:set>
-                                    <p:anim calcmode="lin" valueType="num">
-                                      <p:cBhvr additive="base">
-                                        <p:cTn id="28" dur="500" fill="hold"/>
-                                        <p:tgtEl>
-                                          <p:spTgt spid="10"/>
-                                        </p:tgtEl>
-                                        <p:attrNameLst>
-                                          <p:attrName>ppt_x</p:attrName>
-                                        </p:attrNameLst>
-                                      </p:cBhvr>
-                                      <p:tavLst>
-                                        <p:tav tm="0">
-                                          <p:val>
-                                            <p:strVal val="#ppt_x"/>
-                                          </p:val>
-                                        </p:tav>
-                                        <p:tav tm="100000">
-                                          <p:val>
-                                            <p:strVal val="#ppt_x"/>
-                                          </p:val>
-                                        </p:tav>
-                                      </p:tavLst>
-                                    </p:anim>
-                                    <p:anim calcmode="lin" valueType="num">
-                                      <p:cBhvr additive="base">
-                                        <p:cTn id="29" dur="500" fill="hold"/>
-                                        <p:tgtEl>
-                                          <p:spTgt spid="10"/>
                                         </p:tgtEl>
                                         <p:attrNameLst>
                                           <p:attrName>ppt_y</p:attrName>
@@ -16269,7 +16690,7 @@
                 <a:latin typeface="Times New Roman" panose="02020603050405020304" pitchFamily="18" charset="0"/>
                 <a:cs typeface="Times New Roman" panose="02020603050405020304" pitchFamily="18" charset="0"/>
               </a:rPr>
-              <a:t>in less than a minute</a:t>
+              <a:t>in less than a 10 Minute </a:t>
             </a:r>
             <a:endParaRPr lang="en-IN" sz="2500" b="1" i="0" dirty="0">
               <a:solidFill>
@@ -16340,71 +16761,469 @@
             </a:endParaRPr>
           </a:p>
           <a:p>
+            <a:pPr marL="365760" lvl="1" indent="0">
+              <a:lnSpc>
+                <a:spcPct val="150000"/>
+              </a:lnSpc>
+              <a:buNone/>
+            </a:pPr>
+            <a:r>
+              <a:rPr lang="en-US" sz="2200" dirty="0">
+                <a:latin typeface="Times New Roman" panose="02020603050405020304" pitchFamily="18" charset="0"/>
+                <a:cs typeface="Times New Roman" panose="02020603050405020304" pitchFamily="18" charset="0"/>
+              </a:rPr>
+              <a:t>				</a:t>
+            </a:r>
+          </a:p>
+        </p:txBody>
+      </p:sp>
+      <p:sp>
+        <p:nvSpPr>
+          <p:cNvPr id="3" name="Rectangle 2">
+            <a:extLst>
+              <a:ext uri="{FF2B5EF4-FFF2-40B4-BE49-F238E27FC236}">
+                <a16:creationId xmlns:a16="http://schemas.microsoft.com/office/drawing/2014/main" id="{9565EB9E-FE3A-9BA3-3DEA-C952BACD5855}"/>
+              </a:ext>
+            </a:extLst>
+          </p:cNvPr>
+          <p:cNvSpPr/>
+          <p:nvPr/>
+        </p:nvSpPr>
+        <p:spPr>
+          <a:xfrm>
+            <a:off x="0" y="4594820"/>
+            <a:ext cx="2681880" cy="436765"/>
+          </a:xfrm>
+          <a:prstGeom prst="rect">
+            <a:avLst/>
+          </a:prstGeom>
+        </p:spPr>
+        <p:style>
+          <a:lnRef idx="2">
+            <a:schemeClr val="accent1">
+              <a:shade val="50000"/>
+            </a:schemeClr>
+          </a:lnRef>
+          <a:fillRef idx="1">
+            <a:schemeClr val="accent1"/>
+          </a:fillRef>
+          <a:effectRef idx="0">
+            <a:schemeClr val="accent1"/>
+          </a:effectRef>
+          <a:fontRef idx="minor">
+            <a:schemeClr val="lt1"/>
+          </a:fontRef>
+        </p:style>
+        <p:txBody>
+          <a:bodyPr rtlCol="0" anchor="ctr"/>
+          <a:lstStyle/>
+          <a:p>
+            <a:pPr algn="ctr"/>
+            <a:r>
+              <a:rPr lang="en-US" dirty="0"/>
+              <a:t>Features of Grow green</a:t>
+            </a:r>
+            <a:endParaRPr lang="en-IN" dirty="0"/>
+          </a:p>
+        </p:txBody>
+      </p:sp>
+      <p:sp>
+        <p:nvSpPr>
+          <p:cNvPr id="7" name="Rectangle 6">
+            <a:extLst>
+              <a:ext uri="{FF2B5EF4-FFF2-40B4-BE49-F238E27FC236}">
+                <a16:creationId xmlns:a16="http://schemas.microsoft.com/office/drawing/2014/main" id="{6D96177E-DB30-AFEC-A7FB-E277B65A7BF5}"/>
+              </a:ext>
+            </a:extLst>
+          </p:cNvPr>
+          <p:cNvSpPr/>
+          <p:nvPr/>
+        </p:nvSpPr>
+        <p:spPr>
+          <a:xfrm>
+            <a:off x="3969365" y="3272043"/>
+            <a:ext cx="4566044" cy="526872"/>
+          </a:xfrm>
+          <a:prstGeom prst="rect">
+            <a:avLst/>
+          </a:prstGeom>
+        </p:spPr>
+        <p:style>
+          <a:lnRef idx="2">
+            <a:schemeClr val="accent1">
+              <a:shade val="50000"/>
+            </a:schemeClr>
+          </a:lnRef>
+          <a:fillRef idx="1">
+            <a:schemeClr val="accent1"/>
+          </a:fillRef>
+          <a:effectRef idx="0">
+            <a:schemeClr val="accent1"/>
+          </a:effectRef>
+          <a:fontRef idx="minor">
+            <a:schemeClr val="lt1"/>
+          </a:fontRef>
+        </p:style>
+        <p:txBody>
+          <a:bodyPr rtlCol="0" anchor="ctr"/>
+          <a:lstStyle/>
+          <a:p>
+            <a:pPr algn="ctr"/>
+            <a:r>
+              <a:rPr lang="en-US" sz="1800" dirty="0">
+                <a:latin typeface="Times New Roman" panose="02020603050405020304" pitchFamily="18" charset="0"/>
+                <a:cs typeface="Times New Roman" panose="02020603050405020304" pitchFamily="18" charset="0"/>
+              </a:rPr>
+              <a:t>User can plant a tree without any money.</a:t>
+            </a:r>
+          </a:p>
+          <a:p>
+            <a:pPr algn="ctr"/>
+            <a:endParaRPr lang="en-IN" dirty="0"/>
+          </a:p>
+        </p:txBody>
+      </p:sp>
+      <p:sp>
+        <p:nvSpPr>
+          <p:cNvPr id="8" name="Rectangle 7">
+            <a:extLst>
+              <a:ext uri="{FF2B5EF4-FFF2-40B4-BE49-F238E27FC236}">
+                <a16:creationId xmlns:a16="http://schemas.microsoft.com/office/drawing/2014/main" id="{8328A351-60DF-CE75-B696-EFD03838D219}"/>
+              </a:ext>
+            </a:extLst>
+          </p:cNvPr>
+          <p:cNvSpPr/>
+          <p:nvPr/>
+        </p:nvSpPr>
+        <p:spPr>
+          <a:xfrm>
+            <a:off x="3969365" y="5257800"/>
+            <a:ext cx="4607424" cy="589756"/>
+          </a:xfrm>
+          <a:prstGeom prst="rect">
+            <a:avLst/>
+          </a:prstGeom>
+        </p:spPr>
+        <p:style>
+          <a:lnRef idx="2">
+            <a:schemeClr val="accent1">
+              <a:shade val="50000"/>
+            </a:schemeClr>
+          </a:lnRef>
+          <a:fillRef idx="1">
+            <a:schemeClr val="accent1"/>
+          </a:fillRef>
+          <a:effectRef idx="0">
+            <a:schemeClr val="accent1"/>
+          </a:effectRef>
+          <a:fontRef idx="minor">
+            <a:schemeClr val="lt1"/>
+          </a:fontRef>
+        </p:style>
+        <p:txBody>
+          <a:bodyPr rtlCol="0" anchor="ctr"/>
+          <a:lstStyle/>
+          <a:p>
             <a:pPr lvl="1">
               <a:lnSpc>
                 <a:spcPct val="150000"/>
               </a:lnSpc>
-              <a:buFont typeface="Wingdings" panose="05000000000000000000" pitchFamily="2" charset="2"/>
-              <a:buChar char="Ø"/>
             </a:pPr>
             <a:r>
-              <a:rPr lang="en-US" sz="2200" dirty="0">
+              <a:rPr lang="en-US" sz="1800" dirty="0">
                 <a:latin typeface="Times New Roman" panose="02020603050405020304" pitchFamily="18" charset="0"/>
                 <a:cs typeface="Times New Roman" panose="02020603050405020304" pitchFamily="18" charset="0"/>
               </a:rPr>
-              <a:t>	1)User can plant a tree without any money.</a:t>
-            </a:r>
-          </a:p>
+              <a:t>Those who don’t have the time can donate.</a:t>
+            </a:r>
+          </a:p>
+          <a:p>
+            <a:pPr algn="ctr"/>
+            <a:endParaRPr lang="en-IN" dirty="0"/>
+          </a:p>
+        </p:txBody>
+      </p:sp>
+      <p:sp>
+        <p:nvSpPr>
+          <p:cNvPr id="10" name="Rectangle 9">
+            <a:extLst>
+              <a:ext uri="{FF2B5EF4-FFF2-40B4-BE49-F238E27FC236}">
+                <a16:creationId xmlns:a16="http://schemas.microsoft.com/office/drawing/2014/main" id="{56109577-F236-49C5-5963-B34F90226545}"/>
+              </a:ext>
+            </a:extLst>
+          </p:cNvPr>
+          <p:cNvSpPr/>
+          <p:nvPr/>
+        </p:nvSpPr>
+        <p:spPr>
+          <a:xfrm>
+            <a:off x="3977682" y="4218499"/>
+            <a:ext cx="4598701" cy="589756"/>
+          </a:xfrm>
+          <a:prstGeom prst="rect">
+            <a:avLst/>
+          </a:prstGeom>
+        </p:spPr>
+        <p:style>
+          <a:lnRef idx="2">
+            <a:schemeClr val="accent1">
+              <a:shade val="50000"/>
+            </a:schemeClr>
+          </a:lnRef>
+          <a:fillRef idx="1">
+            <a:schemeClr val="accent1"/>
+          </a:fillRef>
+          <a:effectRef idx="0">
+            <a:schemeClr val="accent1"/>
+          </a:effectRef>
+          <a:fontRef idx="minor">
+            <a:schemeClr val="lt1"/>
+          </a:fontRef>
+        </p:style>
+        <p:txBody>
+          <a:bodyPr rtlCol="0" anchor="ctr"/>
+          <a:lstStyle/>
           <a:p>
             <a:pPr lvl="1">
               <a:lnSpc>
                 <a:spcPct val="150000"/>
               </a:lnSpc>
-              <a:buFont typeface="Wingdings" panose="05000000000000000000" pitchFamily="2" charset="2"/>
-              <a:buChar char="Ø"/>
             </a:pPr>
             <a:r>
-              <a:rPr lang="en-US" sz="2200" dirty="0">
+              <a:rPr lang="en-US" sz="1800" dirty="0">
                 <a:latin typeface="Times New Roman" panose="02020603050405020304" pitchFamily="18" charset="0"/>
                 <a:cs typeface="Times New Roman" panose="02020603050405020304" pitchFamily="18" charset="0"/>
               </a:rPr>
-              <a:t>	2)Those who don’t have the time can donate.</a:t>
-            </a:r>
-          </a:p>
-          <a:p>
-            <a:pPr lvl="1">
-              <a:lnSpc>
-                <a:spcPct val="150000"/>
-              </a:lnSpc>
-              <a:buFont typeface="Wingdings" panose="05000000000000000000" pitchFamily="2" charset="2"/>
-              <a:buChar char="Ø"/>
-            </a:pPr>
-            <a:r>
-              <a:rPr lang="en-US" sz="2200" dirty="0">
+              <a:t>Users can call our team to plant a tree.</a:t>
+            </a:r>
+          </a:p>
+          <a:p>
+            <a:pPr algn="ctr"/>
+            <a:endParaRPr lang="en-IN" dirty="0"/>
+          </a:p>
+        </p:txBody>
+      </p:sp>
+      <p:sp>
+        <p:nvSpPr>
+          <p:cNvPr id="11" name="Rectangle 10">
+            <a:extLst>
+              <a:ext uri="{FF2B5EF4-FFF2-40B4-BE49-F238E27FC236}">
+                <a16:creationId xmlns:a16="http://schemas.microsoft.com/office/drawing/2014/main" id="{E2085F91-BA35-7663-E14A-6F62629E5F69}"/>
+              </a:ext>
+            </a:extLst>
+          </p:cNvPr>
+          <p:cNvSpPr/>
+          <p:nvPr/>
+        </p:nvSpPr>
+        <p:spPr>
+          <a:xfrm>
+            <a:off x="3977682" y="6143267"/>
+            <a:ext cx="4598701" cy="589756"/>
+          </a:xfrm>
+          <a:prstGeom prst="rect">
+            <a:avLst/>
+          </a:prstGeom>
+        </p:spPr>
+        <p:style>
+          <a:lnRef idx="2">
+            <a:schemeClr val="accent1">
+              <a:shade val="50000"/>
+            </a:schemeClr>
+          </a:lnRef>
+          <a:fillRef idx="1">
+            <a:schemeClr val="accent1"/>
+          </a:fillRef>
+          <a:effectRef idx="0">
+            <a:schemeClr val="accent1"/>
+          </a:effectRef>
+          <a:fontRef idx="minor">
+            <a:schemeClr val="lt1"/>
+          </a:fontRef>
+        </p:style>
+        <p:txBody>
+          <a:bodyPr rtlCol="0" anchor="ctr"/>
+          <a:lstStyle/>
+          <a:p>
+            <a:pPr algn="ctr"/>
+            <a:r>
+              <a:rPr lang="en-US" sz="1800" dirty="0">
                 <a:latin typeface="Times New Roman" panose="02020603050405020304" pitchFamily="18" charset="0"/>
                 <a:cs typeface="Times New Roman" panose="02020603050405020304" pitchFamily="18" charset="0"/>
               </a:rPr>
-              <a:t>	3) Users can call our team to plant a tree.</a:t>
-            </a:r>
-          </a:p>
-          <a:p>
-            <a:pPr lvl="1">
-              <a:lnSpc>
-                <a:spcPct val="150000"/>
-              </a:lnSpc>
-              <a:buFont typeface="Wingdings" panose="05000000000000000000" pitchFamily="2" charset="2"/>
-              <a:buChar char="Ø"/>
-            </a:pPr>
-            <a:r>
-              <a:rPr lang="en-US" sz="2200" dirty="0">
-                <a:latin typeface="Times New Roman" panose="02020603050405020304" pitchFamily="18" charset="0"/>
-                <a:cs typeface="Times New Roman" panose="02020603050405020304" pitchFamily="18" charset="0"/>
-              </a:rPr>
-              <a:t>	4)visit grow_green.org for more information.</a:t>
-            </a:r>
-          </a:p>
-        </p:txBody>
-      </p:sp>
+              <a:t>visit grow_green.org for more information.</a:t>
+            </a:r>
+            <a:endParaRPr lang="en-IN" dirty="0"/>
+          </a:p>
+        </p:txBody>
+      </p:sp>
+      <p:cxnSp>
+        <p:nvCxnSpPr>
+          <p:cNvPr id="12" name="Straight Arrow Connector 11">
+            <a:extLst>
+              <a:ext uri="{FF2B5EF4-FFF2-40B4-BE49-F238E27FC236}">
+                <a16:creationId xmlns:a16="http://schemas.microsoft.com/office/drawing/2014/main" id="{EA3A5282-ED8F-38C5-6B11-3560D810C2C6}"/>
+              </a:ext>
+            </a:extLst>
+          </p:cNvPr>
+          <p:cNvCxnSpPr>
+            <a:stCxn id="3" idx="3"/>
+          </p:cNvCxnSpPr>
+          <p:nvPr/>
+        </p:nvCxnSpPr>
+        <p:spPr>
+          <a:xfrm flipV="1">
+            <a:off x="2681880" y="3501110"/>
+            <a:ext cx="1264564" cy="1312093"/>
+          </a:xfrm>
+          <a:prstGeom prst="straightConnector1">
+            <a:avLst/>
+          </a:prstGeom>
+          <a:ln>
+            <a:tailEnd type="triangle"/>
+          </a:ln>
+        </p:spPr>
+        <p:style>
+          <a:lnRef idx="1">
+            <a:schemeClr val="accent1"/>
+          </a:lnRef>
+          <a:fillRef idx="0">
+            <a:schemeClr val="accent1"/>
+          </a:fillRef>
+          <a:effectRef idx="0">
+            <a:schemeClr val="accent1"/>
+          </a:effectRef>
+          <a:fontRef idx="minor">
+            <a:schemeClr val="tx1"/>
+          </a:fontRef>
+        </p:style>
+      </p:cxnSp>
+      <p:cxnSp>
+        <p:nvCxnSpPr>
+          <p:cNvPr id="13" name="Straight Arrow Connector 12">
+            <a:extLst>
+              <a:ext uri="{FF2B5EF4-FFF2-40B4-BE49-F238E27FC236}">
+                <a16:creationId xmlns:a16="http://schemas.microsoft.com/office/drawing/2014/main" id="{D302E269-6721-533C-50FA-CA1B34791CF7}"/>
+              </a:ext>
+            </a:extLst>
+          </p:cNvPr>
+          <p:cNvCxnSpPr>
+            <a:cxnSpLocks/>
+            <a:stCxn id="3" idx="3"/>
+            <a:endCxn id="10" idx="1"/>
+          </p:cNvCxnSpPr>
+          <p:nvPr/>
+        </p:nvCxnSpPr>
+        <p:spPr>
+          <a:xfrm flipV="1">
+            <a:off x="2681880" y="4513377"/>
+            <a:ext cx="1295802" cy="299826"/>
+          </a:xfrm>
+          <a:prstGeom prst="straightConnector1">
+            <a:avLst/>
+          </a:prstGeom>
+          <a:ln>
+            <a:tailEnd type="triangle"/>
+          </a:ln>
+        </p:spPr>
+        <p:style>
+          <a:lnRef idx="1">
+            <a:schemeClr val="accent1"/>
+          </a:lnRef>
+          <a:fillRef idx="0">
+            <a:schemeClr val="accent1"/>
+          </a:fillRef>
+          <a:effectRef idx="0">
+            <a:schemeClr val="accent1"/>
+          </a:effectRef>
+          <a:fontRef idx="minor">
+            <a:schemeClr val="tx1"/>
+          </a:fontRef>
+        </p:style>
+      </p:cxnSp>
+      <p:cxnSp>
+        <p:nvCxnSpPr>
+          <p:cNvPr id="16" name="Straight Arrow Connector 15">
+            <a:extLst>
+              <a:ext uri="{FF2B5EF4-FFF2-40B4-BE49-F238E27FC236}">
+                <a16:creationId xmlns:a16="http://schemas.microsoft.com/office/drawing/2014/main" id="{9BC220E1-7F19-F34D-2223-34E8E57A04F7}"/>
+              </a:ext>
+            </a:extLst>
+          </p:cNvPr>
+          <p:cNvCxnSpPr>
+            <a:cxnSpLocks/>
+            <a:stCxn id="3" idx="3"/>
+          </p:cNvCxnSpPr>
+          <p:nvPr/>
+        </p:nvCxnSpPr>
+        <p:spPr>
+          <a:xfrm>
+            <a:off x="2681880" y="4813203"/>
+            <a:ext cx="1264564" cy="657555"/>
+          </a:xfrm>
+          <a:prstGeom prst="straightConnector1">
+            <a:avLst/>
+          </a:prstGeom>
+          <a:ln>
+            <a:tailEnd type="triangle"/>
+          </a:ln>
+        </p:spPr>
+        <p:style>
+          <a:lnRef idx="1">
+            <a:schemeClr val="accent1"/>
+          </a:lnRef>
+          <a:fillRef idx="0">
+            <a:schemeClr val="accent1"/>
+          </a:fillRef>
+          <a:effectRef idx="0">
+            <a:schemeClr val="accent1"/>
+          </a:effectRef>
+          <a:fontRef idx="minor">
+            <a:schemeClr val="tx1"/>
+          </a:fontRef>
+        </p:style>
+      </p:cxnSp>
+      <p:cxnSp>
+        <p:nvCxnSpPr>
+          <p:cNvPr id="19" name="Straight Arrow Connector 18">
+            <a:extLst>
+              <a:ext uri="{FF2B5EF4-FFF2-40B4-BE49-F238E27FC236}">
+                <a16:creationId xmlns:a16="http://schemas.microsoft.com/office/drawing/2014/main" id="{830DD465-5EEC-E548-4E8F-A53B84D48A05}"/>
+              </a:ext>
+            </a:extLst>
+          </p:cNvPr>
+          <p:cNvCxnSpPr>
+            <a:cxnSpLocks/>
+            <a:endCxn id="11" idx="1"/>
+          </p:cNvCxnSpPr>
+          <p:nvPr/>
+        </p:nvCxnSpPr>
+        <p:spPr>
+          <a:xfrm>
+            <a:off x="2681880" y="4852397"/>
+            <a:ext cx="1295802" cy="1585748"/>
+          </a:xfrm>
+          <a:prstGeom prst="straightConnector1">
+            <a:avLst/>
+          </a:prstGeom>
+          <a:ln>
+            <a:tailEnd type="triangle"/>
+          </a:ln>
+        </p:spPr>
+        <p:style>
+          <a:lnRef idx="1">
+            <a:schemeClr val="accent1"/>
+          </a:lnRef>
+          <a:fillRef idx="0">
+            <a:schemeClr val="accent1"/>
+          </a:fillRef>
+          <a:effectRef idx="0">
+            <a:schemeClr val="accent1"/>
+          </a:effectRef>
+          <a:fontRef idx="minor">
+            <a:schemeClr val="tx1"/>
+          </a:fontRef>
+        </p:style>
+      </p:cxnSp>
     </p:spTree>
     <p:extLst>
       <p:ext uri="{BB962C8B-B14F-4D97-AF65-F5344CB8AC3E}">
@@ -16748,7 +17567,7 @@
                             </p:stCondLst>
                             <p:childTnLst>
                               <p:par>
-                                <p:cTn id="23" presetID="2" presetClass="entr" presetSubtype="8" fill="hold" nodeType="clickEffect">
+                                <p:cTn id="23" presetID="2" presetClass="entr" presetSubtype="8" fill="hold" grpId="0" nodeType="clickEffect">
                                   <p:stCondLst>
                                     <p:cond delay="0"/>
                                   </p:stCondLst>
@@ -16761,11 +17580,7 @@
                                           </p:stCondLst>
                                         </p:cTn>
                                         <p:tgtEl>
-                                          <p:spTgt spid="6">
-                                            <p:txEl>
-                                              <p:pRg st="4" end="4"/>
-                                            </p:txEl>
-                                          </p:spTgt>
+                                          <p:spTgt spid="3"/>
                                         </p:tgtEl>
                                         <p:attrNameLst>
                                           <p:attrName>style.visibility</p:attrName>
@@ -16779,11 +17594,7 @@
                                       <p:cBhvr additive="base">
                                         <p:cTn id="25" dur="500" fill="hold"/>
                                         <p:tgtEl>
-                                          <p:spTgt spid="6">
-                                            <p:txEl>
-                                              <p:pRg st="4" end="4"/>
-                                            </p:txEl>
-                                          </p:spTgt>
+                                          <p:spTgt spid="3"/>
                                         </p:tgtEl>
                                         <p:attrNameLst>
                                           <p:attrName>ppt_x</p:attrName>
@@ -16806,11 +17617,7 @@
                                       <p:cBhvr additive="base">
                                         <p:cTn id="26" dur="500" fill="hold"/>
                                         <p:tgtEl>
-                                          <p:spTgt spid="6">
-                                            <p:txEl>
-                                              <p:pRg st="4" end="4"/>
-                                            </p:txEl>
-                                          </p:spTgt>
+                                          <p:spTgt spid="3"/>
                                         </p:tgtEl>
                                         <p:attrNameLst>
                                           <p:attrName>ppt_y</p:attrName>
@@ -16851,7 +17658,7 @@
                             </p:stCondLst>
                             <p:childTnLst>
                               <p:par>
-                                <p:cTn id="29" presetID="2" presetClass="entr" presetSubtype="8" fill="hold" nodeType="clickEffect">
+                                <p:cTn id="29" presetID="22" presetClass="entr" presetSubtype="4" fill="hold" nodeType="clickEffect">
                                   <p:stCondLst>
                                     <p:cond delay="0"/>
                                   </p:stCondLst>
@@ -16864,11 +17671,7 @@
                                           </p:stCondLst>
                                         </p:cTn>
                                         <p:tgtEl>
-                                          <p:spTgt spid="6">
-                                            <p:txEl>
-                                              <p:pRg st="5" end="5"/>
-                                            </p:txEl>
-                                          </p:spTgt>
+                                          <p:spTgt spid="12"/>
                                         </p:tgtEl>
                                         <p:attrNameLst>
                                           <p:attrName>style.visibility</p:attrName>
@@ -16878,60 +17681,58 @@
                                         <p:strVal val="visible"/>
                                       </p:to>
                                     </p:set>
-                                    <p:anim calcmode="lin" valueType="num">
-                                      <p:cBhvr additive="base">
-                                        <p:cTn id="31" dur="500" fill="hold"/>
+                                    <p:animEffect transition="in" filter="wipe(down)">
+                                      <p:cBhvr>
+                                        <p:cTn id="31" dur="500"/>
                                         <p:tgtEl>
-                                          <p:spTgt spid="6">
-                                            <p:txEl>
-                                              <p:pRg st="5" end="5"/>
-                                            </p:txEl>
-                                          </p:spTgt>
+                                          <p:spTgt spid="12"/>
+                                        </p:tgtEl>
+                                      </p:cBhvr>
+                                    </p:animEffect>
+                                  </p:childTnLst>
+                                </p:cTn>
+                              </p:par>
+                            </p:childTnLst>
+                          </p:cTn>
+                        </p:par>
+                        <p:par>
+                          <p:cTn id="32" fill="hold">
+                            <p:stCondLst>
+                              <p:cond delay="500"/>
+                            </p:stCondLst>
+                            <p:childTnLst>
+                              <p:par>
+                                <p:cTn id="33" presetID="22" presetClass="entr" presetSubtype="8" fill="hold" grpId="0" nodeType="afterEffect">
+                                  <p:stCondLst>
+                                    <p:cond delay="0"/>
+                                  </p:stCondLst>
+                                  <p:childTnLst>
+                                    <p:set>
+                                      <p:cBhvr>
+                                        <p:cTn id="34" dur="1" fill="hold">
+                                          <p:stCondLst>
+                                            <p:cond delay="0"/>
+                                          </p:stCondLst>
+                                        </p:cTn>
+                                        <p:tgtEl>
+                                          <p:spTgt spid="7"/>
                                         </p:tgtEl>
                                         <p:attrNameLst>
-                                          <p:attrName>ppt_x</p:attrName>
+                                          <p:attrName>style.visibility</p:attrName>
                                         </p:attrNameLst>
                                       </p:cBhvr>
-                                      <p:tavLst>
-                                        <p:tav tm="0">
-                                          <p:val>
-                                            <p:strVal val="0-#ppt_w/2"/>
-                                          </p:val>
-                                        </p:tav>
-                                        <p:tav tm="100000">
-                                          <p:val>
-                                            <p:strVal val="#ppt_x"/>
-                                          </p:val>
-                                        </p:tav>
-                                      </p:tavLst>
-                                    </p:anim>
-                                    <p:anim calcmode="lin" valueType="num">
-                                      <p:cBhvr additive="base">
-                                        <p:cTn id="32" dur="500" fill="hold"/>
+                                      <p:to>
+                                        <p:strVal val="visible"/>
+                                      </p:to>
+                                    </p:set>
+                                    <p:animEffect transition="in" filter="wipe(left)">
+                                      <p:cBhvr>
+                                        <p:cTn id="35" dur="500"/>
                                         <p:tgtEl>
-                                          <p:spTgt spid="6">
-                                            <p:txEl>
-                                              <p:pRg st="5" end="5"/>
-                                            </p:txEl>
-                                          </p:spTgt>
+                                          <p:spTgt spid="7"/>
                                         </p:tgtEl>
-                                        <p:attrNameLst>
-                                          <p:attrName>ppt_y</p:attrName>
-                                        </p:attrNameLst>
                                       </p:cBhvr>
-                                      <p:tavLst>
-                                        <p:tav tm="0">
-                                          <p:val>
-                                            <p:strVal val="#ppt_y"/>
-                                          </p:val>
-                                        </p:tav>
-                                        <p:tav tm="100000">
-                                          <p:val>
-                                            <p:strVal val="#ppt_y"/>
-                                          </p:val>
-                                        </p:tav>
-                                      </p:tavLst>
-                                    </p:anim>
+                                    </p:animEffect>
                                   </p:childTnLst>
                                 </p:cTn>
                               </p:par>
@@ -16942,36 +17743,32 @@
                     </p:cTn>
                   </p:par>
                   <p:par>
-                    <p:cTn id="33" fill="hold">
+                    <p:cTn id="36" fill="hold">
                       <p:stCondLst>
                         <p:cond delay="indefinite"/>
                       </p:stCondLst>
                       <p:childTnLst>
                         <p:par>
-                          <p:cTn id="34" fill="hold">
+                          <p:cTn id="37" fill="hold">
                             <p:stCondLst>
                               <p:cond delay="0"/>
                             </p:stCondLst>
                             <p:childTnLst>
                               <p:par>
-                                <p:cTn id="35" presetID="2" presetClass="entr" presetSubtype="8" fill="hold" nodeType="clickEffect">
+                                <p:cTn id="38" presetID="22" presetClass="entr" presetSubtype="4" fill="hold" nodeType="clickEffect">
                                   <p:stCondLst>
                                     <p:cond delay="0"/>
                                   </p:stCondLst>
                                   <p:childTnLst>
                                     <p:set>
                                       <p:cBhvr>
-                                        <p:cTn id="36" dur="1" fill="hold">
+                                        <p:cTn id="39" dur="1" fill="hold">
                                           <p:stCondLst>
                                             <p:cond delay="0"/>
                                           </p:stCondLst>
                                         </p:cTn>
                                         <p:tgtEl>
-                                          <p:spTgt spid="6">
-                                            <p:txEl>
-                                              <p:pRg st="6" end="6"/>
-                                            </p:txEl>
-                                          </p:spTgt>
+                                          <p:spTgt spid="13"/>
                                         </p:tgtEl>
                                         <p:attrNameLst>
                                           <p:attrName>style.visibility</p:attrName>
@@ -16981,60 +17778,58 @@
                                         <p:strVal val="visible"/>
                                       </p:to>
                                     </p:set>
-                                    <p:anim calcmode="lin" valueType="num">
-                                      <p:cBhvr additive="base">
-                                        <p:cTn id="37" dur="500" fill="hold"/>
+                                    <p:animEffect transition="in" filter="wipe(down)">
+                                      <p:cBhvr>
+                                        <p:cTn id="40" dur="500"/>
                                         <p:tgtEl>
-                                          <p:spTgt spid="6">
-                                            <p:txEl>
-                                              <p:pRg st="6" end="6"/>
-                                            </p:txEl>
-                                          </p:spTgt>
+                                          <p:spTgt spid="13"/>
+                                        </p:tgtEl>
+                                      </p:cBhvr>
+                                    </p:animEffect>
+                                  </p:childTnLst>
+                                </p:cTn>
+                              </p:par>
+                            </p:childTnLst>
+                          </p:cTn>
+                        </p:par>
+                        <p:par>
+                          <p:cTn id="41" fill="hold">
+                            <p:stCondLst>
+                              <p:cond delay="500"/>
+                            </p:stCondLst>
+                            <p:childTnLst>
+                              <p:par>
+                                <p:cTn id="42" presetID="22" presetClass="entr" presetSubtype="8" fill="hold" grpId="0" nodeType="afterEffect">
+                                  <p:stCondLst>
+                                    <p:cond delay="0"/>
+                                  </p:stCondLst>
+                                  <p:childTnLst>
+                                    <p:set>
+                                      <p:cBhvr>
+                                        <p:cTn id="43" dur="1" fill="hold">
+                                          <p:stCondLst>
+                                            <p:cond delay="0"/>
+                                          </p:stCondLst>
+                                        </p:cTn>
+                                        <p:tgtEl>
+                                          <p:spTgt spid="10"/>
                                         </p:tgtEl>
                                         <p:attrNameLst>
-                                          <p:attrName>ppt_x</p:attrName>
+                                          <p:attrName>style.visibility</p:attrName>
                                         </p:attrNameLst>
                                       </p:cBhvr>
-                                      <p:tavLst>
-                                        <p:tav tm="0">
-                                          <p:val>
-                                            <p:strVal val="0-#ppt_w/2"/>
-                                          </p:val>
-                                        </p:tav>
-                                        <p:tav tm="100000">
-                                          <p:val>
-                                            <p:strVal val="#ppt_x"/>
-                                          </p:val>
-                                        </p:tav>
-                                      </p:tavLst>
-                                    </p:anim>
-                                    <p:anim calcmode="lin" valueType="num">
-                                      <p:cBhvr additive="base">
-                                        <p:cTn id="38" dur="500" fill="hold"/>
+                                      <p:to>
+                                        <p:strVal val="visible"/>
+                                      </p:to>
+                                    </p:set>
+                                    <p:animEffect transition="in" filter="wipe(left)">
+                                      <p:cBhvr>
+                                        <p:cTn id="44" dur="500"/>
                                         <p:tgtEl>
-                                          <p:spTgt spid="6">
-                                            <p:txEl>
-                                              <p:pRg st="6" end="6"/>
-                                            </p:txEl>
-                                          </p:spTgt>
+                                          <p:spTgt spid="10"/>
                                         </p:tgtEl>
-                                        <p:attrNameLst>
-                                          <p:attrName>ppt_y</p:attrName>
-                                        </p:attrNameLst>
                                       </p:cBhvr>
-                                      <p:tavLst>
-                                        <p:tav tm="0">
-                                          <p:val>
-                                            <p:strVal val="#ppt_y"/>
-                                          </p:val>
-                                        </p:tav>
-                                        <p:tav tm="100000">
-                                          <p:val>
-                                            <p:strVal val="#ppt_y"/>
-                                          </p:val>
-                                        </p:tav>
-                                      </p:tavLst>
-                                    </p:anim>
+                                    </p:animEffect>
                                   </p:childTnLst>
                                 </p:cTn>
                               </p:par>
@@ -17045,36 +17840,32 @@
                     </p:cTn>
                   </p:par>
                   <p:par>
-                    <p:cTn id="39" fill="hold">
+                    <p:cTn id="45" fill="hold">
                       <p:stCondLst>
                         <p:cond delay="indefinite"/>
                       </p:stCondLst>
                       <p:childTnLst>
                         <p:par>
-                          <p:cTn id="40" fill="hold">
+                          <p:cTn id="46" fill="hold">
                             <p:stCondLst>
                               <p:cond delay="0"/>
                             </p:stCondLst>
                             <p:childTnLst>
                               <p:par>
-                                <p:cTn id="41" presetID="2" presetClass="entr" presetSubtype="8" fill="hold" nodeType="clickEffect">
+                                <p:cTn id="47" presetID="22" presetClass="entr" presetSubtype="8" fill="hold" nodeType="clickEffect">
                                   <p:stCondLst>
                                     <p:cond delay="0"/>
                                   </p:stCondLst>
                                   <p:childTnLst>
                                     <p:set>
                                       <p:cBhvr>
-                                        <p:cTn id="42" dur="1" fill="hold">
+                                        <p:cTn id="48" dur="1" fill="hold">
                                           <p:stCondLst>
                                             <p:cond delay="0"/>
                                           </p:stCondLst>
                                         </p:cTn>
                                         <p:tgtEl>
-                                          <p:spTgt spid="6">
-                                            <p:txEl>
-                                              <p:pRg st="7" end="7"/>
-                                            </p:txEl>
-                                          </p:spTgt>
+                                          <p:spTgt spid="16"/>
                                         </p:tgtEl>
                                         <p:attrNameLst>
                                           <p:attrName>style.visibility</p:attrName>
@@ -17084,60 +17875,155 @@
                                         <p:strVal val="visible"/>
                                       </p:to>
                                     </p:set>
-                                    <p:anim calcmode="lin" valueType="num">
-                                      <p:cBhvr additive="base">
-                                        <p:cTn id="43" dur="500" fill="hold"/>
+                                    <p:animEffect transition="in" filter="wipe(left)">
+                                      <p:cBhvr>
+                                        <p:cTn id="49" dur="500"/>
                                         <p:tgtEl>
-                                          <p:spTgt spid="6">
-                                            <p:txEl>
-                                              <p:pRg st="7" end="7"/>
-                                            </p:txEl>
-                                          </p:spTgt>
+                                          <p:spTgt spid="16"/>
+                                        </p:tgtEl>
+                                      </p:cBhvr>
+                                    </p:animEffect>
+                                  </p:childTnLst>
+                                </p:cTn>
+                              </p:par>
+                            </p:childTnLst>
+                          </p:cTn>
+                        </p:par>
+                        <p:par>
+                          <p:cTn id="50" fill="hold">
+                            <p:stCondLst>
+                              <p:cond delay="500"/>
+                            </p:stCondLst>
+                            <p:childTnLst>
+                              <p:par>
+                                <p:cTn id="51" presetID="22" presetClass="entr" presetSubtype="8" fill="hold" grpId="0" nodeType="afterEffect">
+                                  <p:stCondLst>
+                                    <p:cond delay="0"/>
+                                  </p:stCondLst>
+                                  <p:childTnLst>
+                                    <p:set>
+                                      <p:cBhvr>
+                                        <p:cTn id="52" dur="1" fill="hold">
+                                          <p:stCondLst>
+                                            <p:cond delay="0"/>
+                                          </p:stCondLst>
+                                        </p:cTn>
+                                        <p:tgtEl>
+                                          <p:spTgt spid="8"/>
                                         </p:tgtEl>
                                         <p:attrNameLst>
-                                          <p:attrName>ppt_x</p:attrName>
+                                          <p:attrName>style.visibility</p:attrName>
                                         </p:attrNameLst>
                                       </p:cBhvr>
-                                      <p:tavLst>
-                                        <p:tav tm="0">
-                                          <p:val>
-                                            <p:strVal val="0-#ppt_w/2"/>
-                                          </p:val>
-                                        </p:tav>
-                                        <p:tav tm="100000">
-                                          <p:val>
-                                            <p:strVal val="#ppt_x"/>
-                                          </p:val>
-                                        </p:tav>
-                                      </p:tavLst>
-                                    </p:anim>
-                                    <p:anim calcmode="lin" valueType="num">
-                                      <p:cBhvr additive="base">
-                                        <p:cTn id="44" dur="500" fill="hold"/>
+                                      <p:to>
+                                        <p:strVal val="visible"/>
+                                      </p:to>
+                                    </p:set>
+                                    <p:animEffect transition="in" filter="wipe(left)">
+                                      <p:cBhvr>
+                                        <p:cTn id="53" dur="500"/>
                                         <p:tgtEl>
-                                          <p:spTgt spid="6">
-                                            <p:txEl>
-                                              <p:pRg st="7" end="7"/>
-                                            </p:txEl>
-                                          </p:spTgt>
+                                          <p:spTgt spid="8"/>
+                                        </p:tgtEl>
+                                      </p:cBhvr>
+                                    </p:animEffect>
+                                  </p:childTnLst>
+                                </p:cTn>
+                              </p:par>
+                            </p:childTnLst>
+                          </p:cTn>
+                        </p:par>
+                      </p:childTnLst>
+                    </p:cTn>
+                  </p:par>
+                  <p:par>
+                    <p:cTn id="54" fill="hold">
+                      <p:stCondLst>
+                        <p:cond delay="indefinite"/>
+                      </p:stCondLst>
+                      <p:childTnLst>
+                        <p:par>
+                          <p:cTn id="55" fill="hold">
+                            <p:stCondLst>
+                              <p:cond delay="0"/>
+                            </p:stCondLst>
+                            <p:childTnLst>
+                              <p:par>
+                                <p:cTn id="56" presetID="22" presetClass="entr" presetSubtype="8" fill="hold" nodeType="clickEffect">
+                                  <p:stCondLst>
+                                    <p:cond delay="0"/>
+                                  </p:stCondLst>
+                                  <p:childTnLst>
+                                    <p:set>
+                                      <p:cBhvr>
+                                        <p:cTn id="57" dur="1" fill="hold">
+                                          <p:stCondLst>
+                                            <p:cond delay="0"/>
+                                          </p:stCondLst>
+                                        </p:cTn>
+                                        <p:tgtEl>
+                                          <p:spTgt spid="19"/>
                                         </p:tgtEl>
                                         <p:attrNameLst>
-                                          <p:attrName>ppt_y</p:attrName>
+                                          <p:attrName>style.visibility</p:attrName>
                                         </p:attrNameLst>
                                       </p:cBhvr>
-                                      <p:tavLst>
-                                        <p:tav tm="0">
-                                          <p:val>
-                                            <p:strVal val="#ppt_y"/>
-                                          </p:val>
-                                        </p:tav>
-                                        <p:tav tm="100000">
-                                          <p:val>
-                                            <p:strVal val="#ppt_y"/>
-                                          </p:val>
-                                        </p:tav>
-                                      </p:tavLst>
-                                    </p:anim>
+                                      <p:to>
+                                        <p:strVal val="visible"/>
+                                      </p:to>
+                                    </p:set>
+                                    <p:animEffect transition="in" filter="wipe(left)">
+                                      <p:cBhvr>
+                                        <p:cTn id="58" dur="500"/>
+                                        <p:tgtEl>
+                                          <p:spTgt spid="19"/>
+                                        </p:tgtEl>
+                                      </p:cBhvr>
+                                    </p:animEffect>
+                                  </p:childTnLst>
+                                </p:cTn>
+                              </p:par>
+                            </p:childTnLst>
+                          </p:cTn>
+                        </p:par>
+                        <p:par>
+                          <p:cTn id="59" fill="hold">
+                            <p:stCondLst>
+                              <p:cond delay="500"/>
+                            </p:stCondLst>
+                            <p:childTnLst>
+                              <p:par>
+                                <p:cTn id="60" presetID="22" presetClass="entr" presetSubtype="8" fill="hold" grpId="0" nodeType="afterEffect">
+                                  <p:stCondLst>
+                                    <p:cond delay="0"/>
+                                  </p:stCondLst>
+                                  <p:childTnLst>
+                                    <p:set>
+                                      <p:cBhvr>
+                                        <p:cTn id="61" dur="1" fill="hold">
+                                          <p:stCondLst>
+                                            <p:cond delay="0"/>
+                                          </p:stCondLst>
+                                        </p:cTn>
+                                        <p:tgtEl>
+                                          <p:spTgt spid="11"/>
+                                        </p:tgtEl>
+                                        <p:attrNameLst>
+                                          <p:attrName>style.visibility</p:attrName>
+                                        </p:attrNameLst>
+                                      </p:cBhvr>
+                                      <p:to>
+                                        <p:strVal val="visible"/>
+                                      </p:to>
+                                    </p:set>
+                                    <p:animEffect transition="in" filter="wipe(left)">
+                                      <p:cBhvr>
+                                        <p:cTn id="62" dur="500"/>
+                                        <p:tgtEl>
+                                          <p:spTgt spid="11"/>
+                                        </p:tgtEl>
+                                      </p:cBhvr>
+                                    </p:animEffect>
                                   </p:childTnLst>
                                 </p:cTn>
                               </p:par>
@@ -17168,6 +18054,13 @@
         </p:cTn>
       </p:par>
     </p:tnLst>
+    <p:bldLst>
+      <p:bldP spid="3" grpId="0" animBg="1"/>
+      <p:bldP spid="7" grpId="0" animBg="1"/>
+      <p:bldP spid="8" grpId="0" animBg="1"/>
+      <p:bldP spid="10" grpId="0" animBg="1"/>
+      <p:bldP spid="11" grpId="0" animBg="1"/>
+    </p:bldLst>
   </p:timing>
 </p:sld>
 </file>

</xml_diff>

<commit_message>
Changes in Contact page
</commit_message>
<xml_diff>
--- a/PBL_PROJECT_FINAL.pptx
+++ b/PBL_PROJECT_FINAL.pptx
@@ -226,7 +226,7 @@
             <a:fld id="{332DA3EE-D654-4F9A-88A6-879917C71670}" type="datetimeFigureOut">
               <a:rPr lang="en-US" smtClean="0"/>
               <a:pPr/>
-              <a:t>5/1/2022</a:t>
+              <a:t>5/3/2022</a:t>
             </a:fld>
             <a:endParaRPr lang="en-US"/>
           </a:p>
@@ -401,7 +401,7 @@
             <a:fld id="{F278CB5B-F3CE-4FE9-9D28-2B934D73C3D6}" type="datetimeFigureOut">
               <a:rPr lang="en-US" smtClean="0"/>
               <a:pPr/>
-              <a:t>5/1/2022</a:t>
+              <a:t>5/3/2022</a:t>
             </a:fld>
             <a:endParaRPr lang="en-US" dirty="0"/>
           </a:p>
@@ -1700,7 +1700,7 @@
             <a:fld id="{10584F5C-4138-4343-93C5-0A76D68DA832}" type="datetime1">
               <a:rPr lang="en-US" smtClean="0"/>
               <a:pPr/>
-              <a:t>5/1/2022</a:t>
+              <a:t>5/3/2022</a:t>
             </a:fld>
             <a:endParaRPr lang="en-US" dirty="0"/>
           </a:p>
@@ -1896,7 +1896,7 @@
             <a:fld id="{7043F687-6054-4761-B0E2-16F499847317}" type="datetime1">
               <a:rPr lang="en-US" smtClean="0"/>
               <a:pPr/>
-              <a:t>5/1/2022</a:t>
+              <a:t>5/3/2022</a:t>
             </a:fld>
             <a:endParaRPr lang="en-US" dirty="0"/>
           </a:p>
@@ -2086,7 +2086,7 @@
             <a:fld id="{69137519-BE30-46D8-B560-1D46F1068F1A}" type="datetime1">
               <a:rPr lang="en-US" smtClean="0"/>
               <a:pPr/>
-              <a:t>5/1/2022</a:t>
+              <a:t>5/3/2022</a:t>
             </a:fld>
             <a:endParaRPr lang="en-US" dirty="0"/>
           </a:p>
@@ -2652,7 +2652,7 @@
             <a:fld id="{397EC67F-B312-45BF-8EBA-3BFE3C676468}" type="datetime1">
               <a:rPr lang="en-US" smtClean="0"/>
               <a:pPr/>
-              <a:t>5/1/2022</a:t>
+              <a:t>5/3/2022</a:t>
             </a:fld>
             <a:endParaRPr lang="en-US" dirty="0"/>
           </a:p>
@@ -3221,7 +3221,7 @@
             <a:fld id="{8FF100CC-2628-4FCA-852E-B9F2891AA2DE}" type="datetime1">
               <a:rPr lang="en-US" smtClean="0"/>
               <a:pPr/>
-              <a:t>5/1/2022</a:t>
+              <a:t>5/3/2022</a:t>
             </a:fld>
             <a:endParaRPr lang="en-US" dirty="0"/>
           </a:p>
@@ -3543,7 +3543,7 @@
             <a:fld id="{F0E7EDD7-8317-4AB7-BF35-0B87B1769DC5}" type="datetime1">
               <a:rPr lang="en-US" smtClean="0"/>
               <a:pPr/>
-              <a:t>5/1/2022</a:t>
+              <a:t>5/3/2022</a:t>
             </a:fld>
             <a:endParaRPr lang="en-IN"/>
           </a:p>
@@ -3718,7 +3718,7 @@
             <a:fld id="{37617CD7-EF94-4689-A2B0-2E7BD8C091A1}" type="datetime1">
               <a:rPr lang="en-US" smtClean="0"/>
               <a:pPr/>
-              <a:t>5/1/2022</a:t>
+              <a:t>5/3/2022</a:t>
             </a:fld>
             <a:endParaRPr lang="en-IN"/>
           </a:p>
@@ -3969,7 +3969,7 @@
             <a:fld id="{71AA873C-1C42-458A-B3B6-E59C060D775B}" type="datetime1">
               <a:rPr lang="en-US" smtClean="0"/>
               <a:pPr/>
-              <a:t>5/1/2022</a:t>
+              <a:t>5/3/2022</a:t>
             </a:fld>
             <a:endParaRPr lang="en-IN"/>
           </a:p>
@@ -4206,7 +4206,7 @@
             <a:fld id="{084A5AEB-314C-474A-9003-54A39EF0BFDB}" type="datetime1">
               <a:rPr lang="en-US" smtClean="0"/>
               <a:pPr/>
-              <a:t>5/1/2022</a:t>
+              <a:t>5/3/2022</a:t>
             </a:fld>
             <a:endParaRPr lang="en-IN"/>
           </a:p>
@@ -4578,7 +4578,7 @@
             <a:fld id="{28D12269-6F6F-4844-97A1-1F18EF393900}" type="datetime1">
               <a:rPr lang="en-US" smtClean="0"/>
               <a:pPr/>
-              <a:t>5/1/2022</a:t>
+              <a:t>5/3/2022</a:t>
             </a:fld>
             <a:endParaRPr lang="en-IN"/>
           </a:p>
@@ -4701,7 +4701,7 @@
             <a:fld id="{0E98BCC2-C6F7-42F5-9CDF-AB16E7422C71}" type="datetime1">
               <a:rPr lang="en-US" smtClean="0"/>
               <a:pPr/>
-              <a:t>5/1/2022</a:t>
+              <a:t>5/3/2022</a:t>
             </a:fld>
             <a:endParaRPr lang="en-IN"/>
           </a:p>
@@ -4890,7 +4890,7 @@
             <a:fld id="{E3F3D2C4-B264-461B-BA60-3413D14760D1}" type="datetime1">
               <a:rPr lang="en-US" smtClean="0"/>
               <a:pPr/>
-              <a:t>5/1/2022</a:t>
+              <a:t>5/3/2022</a:t>
             </a:fld>
             <a:endParaRPr lang="en-US" dirty="0"/>
           </a:p>
@@ -5055,7 +5055,7 @@
             <a:fld id="{FB35FDA6-6C5F-4E0F-85C9-0BD69F705BF1}" type="datetime1">
               <a:rPr lang="en-US" smtClean="0"/>
               <a:pPr/>
-              <a:t>5/1/2022</a:t>
+              <a:t>5/3/2022</a:t>
             </a:fld>
             <a:endParaRPr lang="en-IN"/>
           </a:p>
@@ -5337,7 +5337,7 @@
             <a:fld id="{31DDC787-FDF7-4154-BE1E-F0F6A5E710F3}" type="datetime1">
               <a:rPr lang="en-US" smtClean="0"/>
               <a:pPr/>
-              <a:t>5/1/2022</a:t>
+              <a:t>5/3/2022</a:t>
             </a:fld>
             <a:endParaRPr lang="en-IN"/>
           </a:p>
@@ -5595,7 +5595,7 @@
             <a:fld id="{4E1012BB-7191-4F82-8046-957AA9DABD49}" type="datetime1">
               <a:rPr lang="en-US" smtClean="0"/>
               <a:pPr/>
-              <a:t>5/1/2022</a:t>
+              <a:t>5/3/2022</a:t>
             </a:fld>
             <a:endParaRPr lang="en-IN"/>
           </a:p>
@@ -5770,7 +5770,7 @@
             <a:fld id="{B0C8E792-DEE8-4430-9E0C-D7E90FC0E117}" type="datetime1">
               <a:rPr lang="en-US" smtClean="0"/>
               <a:pPr/>
-              <a:t>5/1/2022</a:t>
+              <a:t>5/3/2022</a:t>
             </a:fld>
             <a:endParaRPr lang="en-IN"/>
           </a:p>
@@ -5955,7 +5955,7 @@
             <a:fld id="{0914688E-CA47-4402-B983-853973939A24}" type="datetime1">
               <a:rPr lang="en-US" smtClean="0"/>
               <a:pPr/>
-              <a:t>5/1/2022</a:t>
+              <a:t>5/3/2022</a:t>
             </a:fld>
             <a:endParaRPr lang="en-IN"/>
           </a:p>
@@ -6152,7 +6152,7 @@
             <a:fld id="{D0A58D4A-610F-4122-92FF-7E2622D960DF}" type="datetime1">
               <a:rPr lang="en-US" smtClean="0"/>
               <a:pPr/>
-              <a:t>5/1/2022</a:t>
+              <a:t>5/3/2022</a:t>
             </a:fld>
             <a:endParaRPr lang="en-IN"/>
           </a:p>
@@ -6327,7 +6327,7 @@
             <a:fld id="{939B0815-2E77-4E24-9554-61629A781DE0}" type="datetime1">
               <a:rPr lang="en-US" smtClean="0"/>
               <a:pPr/>
-              <a:t>5/1/2022</a:t>
+              <a:t>5/3/2022</a:t>
             </a:fld>
             <a:endParaRPr lang="en-IN"/>
           </a:p>
@@ -6578,7 +6578,7 @@
             <a:fld id="{F6B95B5E-DA6D-4907-83B3-5841D124DDEA}" type="datetime1">
               <a:rPr lang="en-US" smtClean="0"/>
               <a:pPr/>
-              <a:t>5/1/2022</a:t>
+              <a:t>5/3/2022</a:t>
             </a:fld>
             <a:endParaRPr lang="en-IN"/>
           </a:p>
@@ -6815,7 +6815,7 @@
             <a:fld id="{9407EBE1-8390-4F17-88EA-FF9185DC1AF7}" type="datetime1">
               <a:rPr lang="en-US" smtClean="0"/>
               <a:pPr/>
-              <a:t>5/1/2022</a:t>
+              <a:t>5/3/2022</a:t>
             </a:fld>
             <a:endParaRPr lang="en-IN"/>
           </a:p>
@@ -7187,7 +7187,7 @@
             <a:fld id="{EA498D89-525D-4622-879C-5FEE1DAF7D6B}" type="datetime1">
               <a:rPr lang="en-US" smtClean="0"/>
               <a:pPr/>
-              <a:t>5/1/2022</a:t>
+              <a:t>5/3/2022</a:t>
             </a:fld>
             <a:endParaRPr lang="en-IN"/>
           </a:p>
@@ -7547,7 +7547,7 @@
             <a:fld id="{E8744240-3047-4315-AA56-14891332084D}" type="datetime1">
               <a:rPr lang="en-US" smtClean="0"/>
               <a:pPr/>
-              <a:t>5/1/2022</a:t>
+              <a:t>5/3/2022</a:t>
             </a:fld>
             <a:endParaRPr lang="en-US" dirty="0"/>
           </a:p>
@@ -7681,7 +7681,7 @@
             <a:fld id="{DA8583DF-A4FF-47F9-A51E-3E4F38485EEA}" type="datetime1">
               <a:rPr lang="en-US" smtClean="0"/>
               <a:pPr/>
-              <a:t>5/1/2022</a:t>
+              <a:t>5/3/2022</a:t>
             </a:fld>
             <a:endParaRPr lang="en-IN"/>
           </a:p>
@@ -7781,7 +7781,7 @@
             <a:fld id="{3006FCBF-C042-43E0-8432-5506E43FED44}" type="datetime1">
               <a:rPr lang="en-US" smtClean="0"/>
               <a:pPr/>
-              <a:t>5/1/2022</a:t>
+              <a:t>5/3/2022</a:t>
             </a:fld>
             <a:endParaRPr lang="en-IN"/>
           </a:p>
@@ -8063,7 +8063,7 @@
             <a:fld id="{00797B92-834C-4D0A-9523-F44DD3F91E5A}" type="datetime1">
               <a:rPr lang="en-US" smtClean="0"/>
               <a:pPr/>
-              <a:t>5/1/2022</a:t>
+              <a:t>5/3/2022</a:t>
             </a:fld>
             <a:endParaRPr lang="en-IN"/>
           </a:p>
@@ -8321,7 +8321,7 @@
             <a:fld id="{B5681F9D-A23D-44D8-A9D9-D98A7D65F367}" type="datetime1">
               <a:rPr lang="en-US" smtClean="0"/>
               <a:pPr/>
-              <a:t>5/1/2022</a:t>
+              <a:t>5/3/2022</a:t>
             </a:fld>
             <a:endParaRPr lang="en-IN"/>
           </a:p>
@@ -8496,7 +8496,7 @@
             <a:fld id="{2F65FD45-0B78-4F6B-86DC-C980709345A1}" type="datetime1">
               <a:rPr lang="en-US" smtClean="0"/>
               <a:pPr/>
-              <a:t>5/1/2022</a:t>
+              <a:t>5/3/2022</a:t>
             </a:fld>
             <a:endParaRPr lang="en-IN"/>
           </a:p>
@@ -8681,7 +8681,7 @@
             <a:fld id="{526C3861-7385-4160-BC36-24D4FB3B8FA7}" type="datetime1">
               <a:rPr lang="en-US" smtClean="0"/>
               <a:pPr/>
-              <a:t>5/1/2022</a:t>
+              <a:t>5/3/2022</a:t>
             </a:fld>
             <a:endParaRPr lang="en-IN"/>
           </a:p>
@@ -8917,7 +8917,7 @@
             <a:fld id="{10796235-1DC1-4C5A-BDC4-D6F3C44B9858}" type="datetime1">
               <a:rPr lang="en-US" smtClean="0"/>
               <a:pPr/>
-              <a:t>5/1/2022</a:t>
+              <a:t>5/3/2022</a:t>
             </a:fld>
             <a:endParaRPr lang="en-US" dirty="0"/>
           </a:p>
@@ -9158,7 +9158,7 @@
             <a:fld id="{D3965C1E-479D-4552-B93A-ED01A5B1440F}" type="datetime1">
               <a:rPr lang="en-US" smtClean="0"/>
               <a:pPr/>
-              <a:t>5/1/2022</a:t>
+              <a:t>5/3/2022</a:t>
             </a:fld>
             <a:endParaRPr lang="en-US" dirty="0"/>
           </a:p>
@@ -9368,7 +9368,7 @@
             <a:fld id="{A1B88777-1028-4FBD-A500-A6F87F8D7DB8}" type="datetime1">
               <a:rPr lang="en-US" smtClean="0"/>
               <a:pPr/>
-              <a:t>5/1/2022</a:t>
+              <a:t>5/3/2022</a:t>
             </a:fld>
             <a:endParaRPr lang="en-US" dirty="0"/>
           </a:p>
@@ -9511,7 +9511,7 @@
             <a:fld id="{D2FF1AC1-DDE1-4B2C-AB3A-600197A159C3}" type="datetime1">
               <a:rPr lang="en-US" smtClean="0"/>
               <a:pPr/>
-              <a:t>5/1/2022</a:t>
+              <a:t>5/3/2022</a:t>
             </a:fld>
             <a:endParaRPr lang="en-US" dirty="0"/>
           </a:p>
@@ -9652,7 +9652,7 @@
             <a:fld id="{4DBB1CA7-EB32-4D19-9B10-85DE260AC6BE}" type="datetime1">
               <a:rPr lang="en-US" smtClean="0"/>
               <a:pPr/>
-              <a:t>5/1/2022</a:t>
+              <a:t>5/3/2022</a:t>
             </a:fld>
             <a:endParaRPr lang="en-US" dirty="0"/>
           </a:p>
@@ -10175,7 +10175,7 @@
             <a:fld id="{852CA255-7297-4248-9C5C-63039D04F3EF}" type="datetime1">
               <a:rPr lang="en-US" smtClean="0"/>
               <a:pPr/>
-              <a:t>5/1/2022</a:t>
+              <a:t>5/3/2022</a:t>
             </a:fld>
             <a:endParaRPr lang="en-US" dirty="0"/>
           </a:p>
@@ -10440,7 +10440,7 @@
             <a:fld id="{E88E5910-4132-4CC5-8FFF-E568F915E17D}" type="datetime1">
               <a:rPr lang="en-US" smtClean="0"/>
               <a:pPr/>
-              <a:t>5/1/2022</a:t>
+              <a:t>5/3/2022</a:t>
             </a:fld>
             <a:endParaRPr lang="en-US" dirty="0"/>
           </a:p>
@@ -11123,7 +11123,7 @@
             <a:fld id="{6C90E5CD-4670-46BC-B506-1DA4E882E822}" type="datetime1">
               <a:rPr lang="en-US" smtClean="0"/>
               <a:pPr/>
-              <a:t>5/1/2022</a:t>
+              <a:t>5/3/2022</a:t>
             </a:fld>
             <a:endParaRPr lang="en-IN" dirty="0"/>
           </a:p>
@@ -11669,7 +11669,7 @@
             <a:fld id="{43F89F02-4EB9-4739-ADF1-E7F46F5808AF}" type="datetime1">
               <a:rPr lang="en-US" smtClean="0"/>
               <a:pPr/>
-              <a:t>5/1/2022</a:t>
+              <a:t>5/3/2022</a:t>
             </a:fld>
             <a:endParaRPr lang="en-IN" dirty="0"/>
           </a:p>
@@ -15406,7 +15406,7 @@
         </p:spPr>
         <p:txBody>
           <a:bodyPr>
-            <a:normAutofit/>
+            <a:normAutofit fontScale="70000" lnSpcReduction="20000"/>
           </a:bodyPr>
           <a:lstStyle/>
           <a:p>
@@ -15414,7 +15414,7 @@
               <a:buNone/>
             </a:pPr>
             <a:r>
-              <a:rPr lang="en-US" altLang="ko-KR" sz="2000" b="1" dirty="0">
+              <a:rPr lang="en-US" altLang="ko-KR" sz="2300" b="1" dirty="0">
                 <a:latin typeface="Times New Roman" panose="02020603050405020304" pitchFamily="18" charset="0"/>
                 <a:ea typeface="굴림" charset="-127"/>
                 <a:cs typeface="Times New Roman" panose="02020603050405020304" pitchFamily="18" charset="0"/>
@@ -15427,7 +15427,7 @@
               <a:buNone/>
             </a:pPr>
             <a:r>
-              <a:rPr lang="en-IN" sz="2000" b="0" i="0" dirty="0">
+              <a:rPr lang="en-IN" sz="2900" b="0" i="0" dirty="0">
                 <a:solidFill>
                   <a:srgbClr val="000000"/>
                 </a:solidFill>
@@ -15435,14 +15435,126 @@
                 <a:latin typeface="Times New Roman" panose="02020603050405020304" pitchFamily="18" charset="0"/>
                 <a:cs typeface="Times New Roman" panose="02020603050405020304" pitchFamily="18" charset="0"/>
               </a:rPr>
-              <a:t>The central government’s afforestation scheme, Green India Mission (GIM), was able to only achieve 2.8 percent of its plantation target, according to the Economic Survey released by the Ministry of Finance on January 29, 2021.</a:t>
+              <a:t>The central government’s afforestation scheme, Green India Mission (</a:t>
+            </a:r>
+            <a:r>
+              <a:rPr lang="en-IN" sz="2900" b="0" i="0" dirty="0">
+                <a:solidFill>
+                  <a:srgbClr val="000000"/>
+                </a:solidFill>
+                <a:effectLst/>
+                <a:latin typeface="Times New Roman" panose="02020603050405020304" pitchFamily="18" charset="0"/>
+                <a:cs typeface="Times New Roman" panose="02020603050405020304" pitchFamily="18" charset="0"/>
+                <a:hlinkClick r:id="rId3"/>
+              </a:rPr>
+              <a:t>GIM</a:t>
+            </a:r>
+            <a:r>
+              <a:rPr lang="en-IN" sz="2900" b="0" i="0" dirty="0">
+                <a:solidFill>
+                  <a:srgbClr val="000000"/>
+                </a:solidFill>
+                <a:effectLst/>
+                <a:latin typeface="Times New Roman" panose="02020603050405020304" pitchFamily="18" charset="0"/>
+                <a:cs typeface="Times New Roman" panose="02020603050405020304" pitchFamily="18" charset="0"/>
+              </a:rPr>
+              <a:t>), was able to only achieve 2.8 percent of its plantation target, according to the Economic Survey released by the Ministry of Finance on January 29, 2021.</a:t>
             </a:r>
           </a:p>
           <a:p>
             <a:pPr marL="0" lvl="1" indent="0">
               <a:buNone/>
             </a:pPr>
-            <a:endParaRPr lang="en-US" altLang="ko-KR" sz="2000" b="1" dirty="0">
+            <a:endParaRPr lang="en-IN" sz="2300" b="0" i="0" dirty="0">
+              <a:solidFill>
+                <a:srgbClr val="000000"/>
+              </a:solidFill>
+              <a:effectLst/>
+              <a:latin typeface="Times New Roman" panose="02020603050405020304" pitchFamily="18" charset="0"/>
+              <a:cs typeface="Times New Roman" panose="02020603050405020304" pitchFamily="18" charset="0"/>
+            </a:endParaRPr>
+          </a:p>
+          <a:p>
+            <a:pPr marL="194310" indent="-514350">
+              <a:buFont typeface="Wingdings" panose="05000000000000000000" pitchFamily="2" charset="2"/>
+              <a:buChar char="ü"/>
+            </a:pPr>
+            <a:r>
+              <a:rPr lang="en-IN" dirty="0">
+                <a:latin typeface="Times New Roman" panose="02020603050405020304" pitchFamily="18" charset="0"/>
+                <a:cs typeface="Times New Roman" panose="02020603050405020304" pitchFamily="18" charset="0"/>
+              </a:rPr>
+              <a:t>Lack of Nutrients</a:t>
+            </a:r>
+          </a:p>
+          <a:p>
+            <a:pPr marL="137160" indent="-457200">
+              <a:buFont typeface="Wingdings" panose="05000000000000000000" pitchFamily="2" charset="2"/>
+              <a:buChar char="ü"/>
+            </a:pPr>
+            <a:r>
+              <a:rPr lang="en-IN" dirty="0">
+                <a:latin typeface="Times New Roman" panose="02020603050405020304" pitchFamily="18" charset="0"/>
+                <a:cs typeface="Times New Roman" panose="02020603050405020304" pitchFamily="18" charset="0"/>
+              </a:rPr>
+              <a:t>Pests</a:t>
+            </a:r>
+          </a:p>
+          <a:p>
+            <a:pPr marL="137160" indent="-457200">
+              <a:buFont typeface="Wingdings" panose="05000000000000000000" pitchFamily="2" charset="2"/>
+              <a:buChar char="ü"/>
+            </a:pPr>
+            <a:r>
+              <a:rPr lang="en-IN" dirty="0">
+                <a:latin typeface="Times New Roman" panose="02020603050405020304" pitchFamily="18" charset="0"/>
+                <a:cs typeface="Times New Roman" panose="02020603050405020304" pitchFamily="18" charset="0"/>
+              </a:rPr>
+              <a:t>Man-Made Damage</a:t>
+            </a:r>
+          </a:p>
+          <a:p>
+            <a:pPr marL="137160" indent="-457200">
+              <a:buFont typeface="Wingdings" panose="05000000000000000000" pitchFamily="2" charset="2"/>
+              <a:buChar char="ü"/>
+            </a:pPr>
+            <a:r>
+              <a:rPr lang="en-IN" dirty="0">
+                <a:solidFill>
+                  <a:srgbClr val="000000"/>
+                </a:solidFill>
+                <a:latin typeface="Times New Roman" panose="02020603050405020304" pitchFamily="18" charset="0"/>
+                <a:cs typeface="Times New Roman" panose="02020603050405020304" pitchFamily="18" charset="0"/>
+              </a:rPr>
+              <a:t>Lack of maintenance </a:t>
+            </a:r>
+            <a:endParaRPr lang="en-IN" i="0" dirty="0">
+              <a:solidFill>
+                <a:srgbClr val="000000"/>
+              </a:solidFill>
+              <a:effectLst/>
+              <a:latin typeface="Times New Roman" panose="02020603050405020304" pitchFamily="18" charset="0"/>
+              <a:cs typeface="Times New Roman" panose="02020603050405020304" pitchFamily="18" charset="0"/>
+            </a:endParaRPr>
+          </a:p>
+          <a:p>
+            <a:pPr marL="0" lvl="1" indent="0">
+              <a:buNone/>
+            </a:pPr>
+            <a:endParaRPr lang="en-IN" sz="2300" b="0" i="0" dirty="0">
+              <a:solidFill>
+                <a:srgbClr val="000000"/>
+              </a:solidFill>
+              <a:effectLst/>
+              <a:latin typeface="Times New Roman" panose="02020603050405020304" pitchFamily="18" charset="0"/>
+              <a:cs typeface="Times New Roman" panose="02020603050405020304" pitchFamily="18" charset="0"/>
+            </a:endParaRPr>
+          </a:p>
+          <a:p>
+            <a:pPr marL="0" lvl="1" indent="0">
+              <a:buNone/>
+            </a:pPr>
+            <a:endParaRPr lang="en-US" altLang="ko-KR" sz="2300" b="1" dirty="0">
               <a:latin typeface="Times New Roman" panose="02020603050405020304" pitchFamily="18" charset="0"/>
               <a:ea typeface="굴림" charset="-127"/>
               <a:cs typeface="Times New Roman" panose="02020603050405020304" pitchFamily="18" charset="0"/>
@@ -15453,7 +15565,7 @@
               <a:buNone/>
             </a:pPr>
             <a:r>
-              <a:rPr lang="en-US" altLang="ko-KR" sz="2000" b="1" dirty="0">
+              <a:rPr lang="en-US" altLang="ko-KR" sz="2900" b="1" dirty="0">
                 <a:latin typeface="Times New Roman" panose="02020603050405020304" pitchFamily="18" charset="0"/>
                 <a:ea typeface="굴림" charset="-127"/>
                 <a:cs typeface="Times New Roman" panose="02020603050405020304" pitchFamily="18" charset="0"/>
@@ -15466,14 +15578,14 @@
               <a:buNone/>
             </a:pPr>
             <a:r>
-              <a:rPr lang="en-US" sz="2000" dirty="0">
+              <a:rPr lang="en-US" dirty="0">
                 <a:latin typeface="Times New Roman" panose="02020603050405020304" pitchFamily="18" charset="0"/>
                 <a:cs typeface="Times New Roman" panose="02020603050405020304" pitchFamily="18" charset="0"/>
               </a:rPr>
-              <a:t>We provide a platform where anyone can plant or donate a tree and </a:t>
-            </a:r>
-            <a:r>
-              <a:rPr lang="en-US" altLang="ko-KR" sz="2000" dirty="0">
+              <a:t>We are providing a platform where anyone can plant or donate a tree and </a:t>
+            </a:r>
+            <a:r>
+              <a:rPr lang="en-US" altLang="ko-KR" dirty="0">
                 <a:latin typeface="Times New Roman" panose="02020603050405020304" pitchFamily="18" charset="0"/>
                 <a:ea typeface="굴림" charset="-127"/>
                 <a:cs typeface="Times New Roman" panose="02020603050405020304" pitchFamily="18" charset="0"/>
@@ -15502,7 +15614,7 @@
           <p:nvPr/>
         </p:nvPicPr>
         <p:blipFill>
-          <a:blip r:embed="rId3">
+          <a:blip r:embed="rId4">
             <a:extLst>
               <a:ext uri="{28A0092B-C50C-407E-A947-70E740481C1C}">
                 <a14:useLocalDpi xmlns:a14="http://schemas.microsoft.com/office/drawing/2010/main" val="0"/>
@@ -15545,36 +15657,6 @@
               </a14:hiddenLine>
             </a:ext>
           </a:extLst>
-        </p:spPr>
-      </p:pic>
-      <p:pic>
-        <p:nvPicPr>
-          <p:cNvPr id="10" name="Picture 9">
-            <a:extLst>
-              <a:ext uri="{FF2B5EF4-FFF2-40B4-BE49-F238E27FC236}">
-                <a16:creationId xmlns:a16="http://schemas.microsoft.com/office/drawing/2014/main" id="{0CA40A2C-C676-42B5-F022-0C65A5E5C48D}"/>
-              </a:ext>
-            </a:extLst>
-          </p:cNvPr>
-          <p:cNvPicPr>
-            <a:picLocks noChangeAspect="1"/>
-          </p:cNvPicPr>
-          <p:nvPr/>
-        </p:nvPicPr>
-        <p:blipFill>
-          <a:blip r:embed="rId4"/>
-          <a:stretch>
-            <a:fillRect/>
-          </a:stretch>
-        </p:blipFill>
-        <p:spPr>
-          <a:xfrm>
-            <a:off x="2483768" y="4743668"/>
-            <a:ext cx="3324225" cy="1971675"/>
-          </a:xfrm>
-          <a:prstGeom prst="rect">
-            <a:avLst/>
-          </a:prstGeom>
         </p:spPr>
       </p:pic>
     </p:spTree>
@@ -15693,21 +15775,30 @@
                             </p:childTnLst>
                           </p:cTn>
                         </p:par>
+                      </p:childTnLst>
+                    </p:cTn>
+                  </p:par>
+                  <p:par>
+                    <p:cTn id="9" fill="hold">
+                      <p:stCondLst>
+                        <p:cond delay="indefinite"/>
+                      </p:stCondLst>
+                      <p:childTnLst>
                         <p:par>
-                          <p:cTn id="9" fill="hold">
+                          <p:cTn id="10" fill="hold">
                             <p:stCondLst>
-                              <p:cond delay="500"/>
+                              <p:cond delay="0"/>
                             </p:stCondLst>
                             <p:childTnLst>
                               <p:par>
-                                <p:cTn id="10" presetID="2" presetClass="entr" presetSubtype="8" fill="hold" nodeType="afterEffect">
+                                <p:cTn id="11" presetID="2" presetClass="entr" presetSubtype="8" fill="hold" nodeType="clickEffect">
                                   <p:stCondLst>
                                     <p:cond delay="0"/>
                                   </p:stCondLst>
                                   <p:childTnLst>
                                     <p:set>
                                       <p:cBhvr>
-                                        <p:cTn id="11" dur="1" fill="hold">
+                                        <p:cTn id="12" dur="1" fill="hold">
                                           <p:stCondLst>
                                             <p:cond delay="0"/>
                                           </p:stCondLst>
@@ -15729,7 +15820,7 @@
                                     </p:set>
                                     <p:anim calcmode="lin" valueType="num">
                                       <p:cBhvr additive="base">
-                                        <p:cTn id="12" dur="500" fill="hold"/>
+                                        <p:cTn id="13" dur="500" fill="hold"/>
                                         <p:tgtEl>
                                           <p:spTgt spid="3">
                                             <p:txEl>
@@ -15756,7 +15847,7 @@
                                     </p:anim>
                                     <p:anim calcmode="lin" valueType="num">
                                       <p:cBhvr additive="base">
-                                        <p:cTn id="13" dur="500" fill="hold"/>
+                                        <p:cTn id="14" dur="500" fill="hold"/>
                                         <p:tgtEl>
                                           <p:spTgt spid="3">
                                             <p:txEl>
@@ -15791,26 +15882,26 @@
                     </p:cTn>
                   </p:par>
                   <p:par>
-                    <p:cTn id="14" fill="hold">
+                    <p:cTn id="15" fill="hold">
                       <p:stCondLst>
                         <p:cond delay="indefinite"/>
                       </p:stCondLst>
                       <p:childTnLst>
                         <p:par>
-                          <p:cTn id="15" fill="hold">
+                          <p:cTn id="16" fill="hold">
                             <p:stCondLst>
                               <p:cond delay="0"/>
                             </p:stCondLst>
                             <p:childTnLst>
                               <p:par>
-                                <p:cTn id="16" presetID="2" presetClass="entr" presetSubtype="4" fill="hold" nodeType="clickEffect">
+                                <p:cTn id="17" presetID="2" presetClass="entr" presetSubtype="8" fill="hold" nodeType="clickEffect">
                                   <p:stCondLst>
                                     <p:cond delay="0"/>
                                   </p:stCondLst>
                                   <p:childTnLst>
                                     <p:set>
                                       <p:cBhvr>
-                                        <p:cTn id="17" dur="1" fill="hold">
+                                        <p:cTn id="18" dur="1" fill="hold">
                                           <p:stCondLst>
                                             <p:cond delay="0"/>
                                           </p:stCondLst>
@@ -15832,11 +15923,423 @@
                                     </p:set>
                                     <p:anim calcmode="lin" valueType="num">
                                       <p:cBhvr additive="base">
-                                        <p:cTn id="18" dur="500" fill="hold"/>
+                                        <p:cTn id="19" dur="500" fill="hold"/>
                                         <p:tgtEl>
                                           <p:spTgt spid="3">
                                             <p:txEl>
                                               <p:pRg st="3" end="3"/>
+                                            </p:txEl>
+                                          </p:spTgt>
+                                        </p:tgtEl>
+                                        <p:attrNameLst>
+                                          <p:attrName>ppt_x</p:attrName>
+                                        </p:attrNameLst>
+                                      </p:cBhvr>
+                                      <p:tavLst>
+                                        <p:tav tm="0">
+                                          <p:val>
+                                            <p:strVal val="0-#ppt_w/2"/>
+                                          </p:val>
+                                        </p:tav>
+                                        <p:tav tm="100000">
+                                          <p:val>
+                                            <p:strVal val="#ppt_x"/>
+                                          </p:val>
+                                        </p:tav>
+                                      </p:tavLst>
+                                    </p:anim>
+                                    <p:anim calcmode="lin" valueType="num">
+                                      <p:cBhvr additive="base">
+                                        <p:cTn id="20" dur="500" fill="hold"/>
+                                        <p:tgtEl>
+                                          <p:spTgt spid="3">
+                                            <p:txEl>
+                                              <p:pRg st="3" end="3"/>
+                                            </p:txEl>
+                                          </p:spTgt>
+                                        </p:tgtEl>
+                                        <p:attrNameLst>
+                                          <p:attrName>ppt_y</p:attrName>
+                                        </p:attrNameLst>
+                                      </p:cBhvr>
+                                      <p:tavLst>
+                                        <p:tav tm="0">
+                                          <p:val>
+                                            <p:strVal val="#ppt_y"/>
+                                          </p:val>
+                                        </p:tav>
+                                        <p:tav tm="100000">
+                                          <p:val>
+                                            <p:strVal val="#ppt_y"/>
+                                          </p:val>
+                                        </p:tav>
+                                      </p:tavLst>
+                                    </p:anim>
+                                  </p:childTnLst>
+                                </p:cTn>
+                              </p:par>
+                            </p:childTnLst>
+                          </p:cTn>
+                        </p:par>
+                      </p:childTnLst>
+                    </p:cTn>
+                  </p:par>
+                  <p:par>
+                    <p:cTn id="21" fill="hold">
+                      <p:stCondLst>
+                        <p:cond delay="indefinite"/>
+                      </p:stCondLst>
+                      <p:childTnLst>
+                        <p:par>
+                          <p:cTn id="22" fill="hold">
+                            <p:stCondLst>
+                              <p:cond delay="0"/>
+                            </p:stCondLst>
+                            <p:childTnLst>
+                              <p:par>
+                                <p:cTn id="23" presetID="2" presetClass="entr" presetSubtype="8" fill="hold" nodeType="clickEffect">
+                                  <p:stCondLst>
+                                    <p:cond delay="0"/>
+                                  </p:stCondLst>
+                                  <p:childTnLst>
+                                    <p:set>
+                                      <p:cBhvr>
+                                        <p:cTn id="24" dur="1" fill="hold">
+                                          <p:stCondLst>
+                                            <p:cond delay="0"/>
+                                          </p:stCondLst>
+                                        </p:cTn>
+                                        <p:tgtEl>
+                                          <p:spTgt spid="3">
+                                            <p:txEl>
+                                              <p:pRg st="4" end="4"/>
+                                            </p:txEl>
+                                          </p:spTgt>
+                                        </p:tgtEl>
+                                        <p:attrNameLst>
+                                          <p:attrName>style.visibility</p:attrName>
+                                        </p:attrNameLst>
+                                      </p:cBhvr>
+                                      <p:to>
+                                        <p:strVal val="visible"/>
+                                      </p:to>
+                                    </p:set>
+                                    <p:anim calcmode="lin" valueType="num">
+                                      <p:cBhvr additive="base">
+                                        <p:cTn id="25" dur="500" fill="hold"/>
+                                        <p:tgtEl>
+                                          <p:spTgt spid="3">
+                                            <p:txEl>
+                                              <p:pRg st="4" end="4"/>
+                                            </p:txEl>
+                                          </p:spTgt>
+                                        </p:tgtEl>
+                                        <p:attrNameLst>
+                                          <p:attrName>ppt_x</p:attrName>
+                                        </p:attrNameLst>
+                                      </p:cBhvr>
+                                      <p:tavLst>
+                                        <p:tav tm="0">
+                                          <p:val>
+                                            <p:strVal val="0-#ppt_w/2"/>
+                                          </p:val>
+                                        </p:tav>
+                                        <p:tav tm="100000">
+                                          <p:val>
+                                            <p:strVal val="#ppt_x"/>
+                                          </p:val>
+                                        </p:tav>
+                                      </p:tavLst>
+                                    </p:anim>
+                                    <p:anim calcmode="lin" valueType="num">
+                                      <p:cBhvr additive="base">
+                                        <p:cTn id="26" dur="500" fill="hold"/>
+                                        <p:tgtEl>
+                                          <p:spTgt spid="3">
+                                            <p:txEl>
+                                              <p:pRg st="4" end="4"/>
+                                            </p:txEl>
+                                          </p:spTgt>
+                                        </p:tgtEl>
+                                        <p:attrNameLst>
+                                          <p:attrName>ppt_y</p:attrName>
+                                        </p:attrNameLst>
+                                      </p:cBhvr>
+                                      <p:tavLst>
+                                        <p:tav tm="0">
+                                          <p:val>
+                                            <p:strVal val="#ppt_y"/>
+                                          </p:val>
+                                        </p:tav>
+                                        <p:tav tm="100000">
+                                          <p:val>
+                                            <p:strVal val="#ppt_y"/>
+                                          </p:val>
+                                        </p:tav>
+                                      </p:tavLst>
+                                    </p:anim>
+                                  </p:childTnLst>
+                                </p:cTn>
+                              </p:par>
+                            </p:childTnLst>
+                          </p:cTn>
+                        </p:par>
+                      </p:childTnLst>
+                    </p:cTn>
+                  </p:par>
+                  <p:par>
+                    <p:cTn id="27" fill="hold">
+                      <p:stCondLst>
+                        <p:cond delay="indefinite"/>
+                      </p:stCondLst>
+                      <p:childTnLst>
+                        <p:par>
+                          <p:cTn id="28" fill="hold">
+                            <p:stCondLst>
+                              <p:cond delay="0"/>
+                            </p:stCondLst>
+                            <p:childTnLst>
+                              <p:par>
+                                <p:cTn id="29" presetID="2" presetClass="entr" presetSubtype="8" fill="hold" nodeType="clickEffect">
+                                  <p:stCondLst>
+                                    <p:cond delay="0"/>
+                                  </p:stCondLst>
+                                  <p:childTnLst>
+                                    <p:set>
+                                      <p:cBhvr>
+                                        <p:cTn id="30" dur="1" fill="hold">
+                                          <p:stCondLst>
+                                            <p:cond delay="0"/>
+                                          </p:stCondLst>
+                                        </p:cTn>
+                                        <p:tgtEl>
+                                          <p:spTgt spid="3">
+                                            <p:txEl>
+                                              <p:pRg st="5" end="5"/>
+                                            </p:txEl>
+                                          </p:spTgt>
+                                        </p:tgtEl>
+                                        <p:attrNameLst>
+                                          <p:attrName>style.visibility</p:attrName>
+                                        </p:attrNameLst>
+                                      </p:cBhvr>
+                                      <p:to>
+                                        <p:strVal val="visible"/>
+                                      </p:to>
+                                    </p:set>
+                                    <p:anim calcmode="lin" valueType="num">
+                                      <p:cBhvr additive="base">
+                                        <p:cTn id="31" dur="500" fill="hold"/>
+                                        <p:tgtEl>
+                                          <p:spTgt spid="3">
+                                            <p:txEl>
+                                              <p:pRg st="5" end="5"/>
+                                            </p:txEl>
+                                          </p:spTgt>
+                                        </p:tgtEl>
+                                        <p:attrNameLst>
+                                          <p:attrName>ppt_x</p:attrName>
+                                        </p:attrNameLst>
+                                      </p:cBhvr>
+                                      <p:tavLst>
+                                        <p:tav tm="0">
+                                          <p:val>
+                                            <p:strVal val="0-#ppt_w/2"/>
+                                          </p:val>
+                                        </p:tav>
+                                        <p:tav tm="100000">
+                                          <p:val>
+                                            <p:strVal val="#ppt_x"/>
+                                          </p:val>
+                                        </p:tav>
+                                      </p:tavLst>
+                                    </p:anim>
+                                    <p:anim calcmode="lin" valueType="num">
+                                      <p:cBhvr additive="base">
+                                        <p:cTn id="32" dur="500" fill="hold"/>
+                                        <p:tgtEl>
+                                          <p:spTgt spid="3">
+                                            <p:txEl>
+                                              <p:pRg st="5" end="5"/>
+                                            </p:txEl>
+                                          </p:spTgt>
+                                        </p:tgtEl>
+                                        <p:attrNameLst>
+                                          <p:attrName>ppt_y</p:attrName>
+                                        </p:attrNameLst>
+                                      </p:cBhvr>
+                                      <p:tavLst>
+                                        <p:tav tm="0">
+                                          <p:val>
+                                            <p:strVal val="#ppt_y"/>
+                                          </p:val>
+                                        </p:tav>
+                                        <p:tav tm="100000">
+                                          <p:val>
+                                            <p:strVal val="#ppt_y"/>
+                                          </p:val>
+                                        </p:tav>
+                                      </p:tavLst>
+                                    </p:anim>
+                                  </p:childTnLst>
+                                </p:cTn>
+                              </p:par>
+                            </p:childTnLst>
+                          </p:cTn>
+                        </p:par>
+                      </p:childTnLst>
+                    </p:cTn>
+                  </p:par>
+                  <p:par>
+                    <p:cTn id="33" fill="hold">
+                      <p:stCondLst>
+                        <p:cond delay="indefinite"/>
+                      </p:stCondLst>
+                      <p:childTnLst>
+                        <p:par>
+                          <p:cTn id="34" fill="hold">
+                            <p:stCondLst>
+                              <p:cond delay="0"/>
+                            </p:stCondLst>
+                            <p:childTnLst>
+                              <p:par>
+                                <p:cTn id="35" presetID="2" presetClass="entr" presetSubtype="8" fill="hold" nodeType="clickEffect">
+                                  <p:stCondLst>
+                                    <p:cond delay="0"/>
+                                  </p:stCondLst>
+                                  <p:childTnLst>
+                                    <p:set>
+                                      <p:cBhvr>
+                                        <p:cTn id="36" dur="1" fill="hold">
+                                          <p:stCondLst>
+                                            <p:cond delay="0"/>
+                                          </p:stCondLst>
+                                        </p:cTn>
+                                        <p:tgtEl>
+                                          <p:spTgt spid="3">
+                                            <p:txEl>
+                                              <p:pRg st="6" end="6"/>
+                                            </p:txEl>
+                                          </p:spTgt>
+                                        </p:tgtEl>
+                                        <p:attrNameLst>
+                                          <p:attrName>style.visibility</p:attrName>
+                                        </p:attrNameLst>
+                                      </p:cBhvr>
+                                      <p:to>
+                                        <p:strVal val="visible"/>
+                                      </p:to>
+                                    </p:set>
+                                    <p:anim calcmode="lin" valueType="num">
+                                      <p:cBhvr additive="base">
+                                        <p:cTn id="37" dur="500" fill="hold"/>
+                                        <p:tgtEl>
+                                          <p:spTgt spid="3">
+                                            <p:txEl>
+                                              <p:pRg st="6" end="6"/>
+                                            </p:txEl>
+                                          </p:spTgt>
+                                        </p:tgtEl>
+                                        <p:attrNameLst>
+                                          <p:attrName>ppt_x</p:attrName>
+                                        </p:attrNameLst>
+                                      </p:cBhvr>
+                                      <p:tavLst>
+                                        <p:tav tm="0">
+                                          <p:val>
+                                            <p:strVal val="0-#ppt_w/2"/>
+                                          </p:val>
+                                        </p:tav>
+                                        <p:tav tm="100000">
+                                          <p:val>
+                                            <p:strVal val="#ppt_x"/>
+                                          </p:val>
+                                        </p:tav>
+                                      </p:tavLst>
+                                    </p:anim>
+                                    <p:anim calcmode="lin" valueType="num">
+                                      <p:cBhvr additive="base">
+                                        <p:cTn id="38" dur="500" fill="hold"/>
+                                        <p:tgtEl>
+                                          <p:spTgt spid="3">
+                                            <p:txEl>
+                                              <p:pRg st="6" end="6"/>
+                                            </p:txEl>
+                                          </p:spTgt>
+                                        </p:tgtEl>
+                                        <p:attrNameLst>
+                                          <p:attrName>ppt_y</p:attrName>
+                                        </p:attrNameLst>
+                                      </p:cBhvr>
+                                      <p:tavLst>
+                                        <p:tav tm="0">
+                                          <p:val>
+                                            <p:strVal val="#ppt_y"/>
+                                          </p:val>
+                                        </p:tav>
+                                        <p:tav tm="100000">
+                                          <p:val>
+                                            <p:strVal val="#ppt_y"/>
+                                          </p:val>
+                                        </p:tav>
+                                      </p:tavLst>
+                                    </p:anim>
+                                  </p:childTnLst>
+                                </p:cTn>
+                              </p:par>
+                            </p:childTnLst>
+                          </p:cTn>
+                        </p:par>
+                      </p:childTnLst>
+                    </p:cTn>
+                  </p:par>
+                  <p:par>
+                    <p:cTn id="39" fill="hold">
+                      <p:stCondLst>
+                        <p:cond delay="indefinite"/>
+                      </p:stCondLst>
+                      <p:childTnLst>
+                        <p:par>
+                          <p:cTn id="40" fill="hold">
+                            <p:stCondLst>
+                              <p:cond delay="0"/>
+                            </p:stCondLst>
+                            <p:childTnLst>
+                              <p:par>
+                                <p:cTn id="41" presetID="2" presetClass="entr" presetSubtype="4" fill="hold" nodeType="clickEffect">
+                                  <p:stCondLst>
+                                    <p:cond delay="0"/>
+                                  </p:stCondLst>
+                                  <p:childTnLst>
+                                    <p:set>
+                                      <p:cBhvr>
+                                        <p:cTn id="42" dur="1" fill="hold">
+                                          <p:stCondLst>
+                                            <p:cond delay="0"/>
+                                          </p:stCondLst>
+                                        </p:cTn>
+                                        <p:tgtEl>
+                                          <p:spTgt spid="3">
+                                            <p:txEl>
+                                              <p:pRg st="9" end="9"/>
+                                            </p:txEl>
+                                          </p:spTgt>
+                                        </p:tgtEl>
+                                        <p:attrNameLst>
+                                          <p:attrName>style.visibility</p:attrName>
+                                        </p:attrNameLst>
+                                      </p:cBhvr>
+                                      <p:to>
+                                        <p:strVal val="visible"/>
+                                      </p:to>
+                                    </p:set>
+                                    <p:anim calcmode="lin" valueType="num">
+                                      <p:cBhvr additive="base">
+                                        <p:cTn id="43" dur="500" fill="hold"/>
+                                        <p:tgtEl>
+                                          <p:spTgt spid="3">
+                                            <p:txEl>
+                                              <p:pRg st="9" end="9"/>
                                             </p:txEl>
                                           </p:spTgt>
                                         </p:tgtEl>
@@ -15859,11 +16362,11 @@
                                     </p:anim>
                                     <p:anim calcmode="lin" valueType="num">
                                       <p:cBhvr additive="base">
-                                        <p:cTn id="19" dur="500" fill="hold"/>
+                                        <p:cTn id="44" dur="500" fill="hold"/>
                                         <p:tgtEl>
                                           <p:spTgt spid="3">
                                             <p:txEl>
-                                              <p:pRg st="3" end="3"/>
+                                              <p:pRg st="9" end="9"/>
                                             </p:txEl>
                                           </p:spTgt>
                                         </p:tgtEl>
@@ -15891,20 +16394,20 @@
                           </p:cTn>
                         </p:par>
                         <p:par>
-                          <p:cTn id="20" fill="hold">
+                          <p:cTn id="45" fill="hold">
                             <p:stCondLst>
                               <p:cond delay="500"/>
                             </p:stCondLst>
                             <p:childTnLst>
                               <p:par>
-                                <p:cTn id="21" presetID="2" presetClass="entr" presetSubtype="4" fill="hold" nodeType="afterEffect">
+                                <p:cTn id="46" presetID="2" presetClass="entr" presetSubtype="4" fill="hold" nodeType="afterEffect">
                                   <p:stCondLst>
                                     <p:cond delay="0"/>
                                   </p:stCondLst>
                                   <p:childTnLst>
                                     <p:set>
                                       <p:cBhvr>
-                                        <p:cTn id="22" dur="1" fill="hold">
+                                        <p:cTn id="47" dur="1" fill="hold">
                                           <p:stCondLst>
                                             <p:cond delay="0"/>
                                           </p:stCondLst>
@@ -15912,7 +16415,7 @@
                                         <p:tgtEl>
                                           <p:spTgt spid="3">
                                             <p:txEl>
-                                              <p:pRg st="4" end="4"/>
+                                              <p:pRg st="10" end="10"/>
                                             </p:txEl>
                                           </p:spTgt>
                                         </p:tgtEl>
@@ -15926,11 +16429,11 @@
                                     </p:set>
                                     <p:anim calcmode="lin" valueType="num">
                                       <p:cBhvr additive="base">
-                                        <p:cTn id="23" dur="500" fill="hold"/>
+                                        <p:cTn id="48" dur="500" fill="hold"/>
                                         <p:tgtEl>
                                           <p:spTgt spid="3">
                                             <p:txEl>
-                                              <p:pRg st="4" end="4"/>
+                                              <p:pRg st="10" end="10"/>
                                             </p:txEl>
                                           </p:spTgt>
                                         </p:tgtEl>
@@ -15953,95 +16456,13 @@
                                     </p:anim>
                                     <p:anim calcmode="lin" valueType="num">
                                       <p:cBhvr additive="base">
-                                        <p:cTn id="24" dur="500" fill="hold"/>
+                                        <p:cTn id="49" dur="500" fill="hold"/>
                                         <p:tgtEl>
                                           <p:spTgt spid="3">
                                             <p:txEl>
-                                              <p:pRg st="4" end="4"/>
+                                              <p:pRg st="10" end="10"/>
                                             </p:txEl>
                                           </p:spTgt>
-                                        </p:tgtEl>
-                                        <p:attrNameLst>
-                                          <p:attrName>ppt_y</p:attrName>
-                                        </p:attrNameLst>
-                                      </p:cBhvr>
-                                      <p:tavLst>
-                                        <p:tav tm="0">
-                                          <p:val>
-                                            <p:strVal val="1+#ppt_h/2"/>
-                                          </p:val>
-                                        </p:tav>
-                                        <p:tav tm="100000">
-                                          <p:val>
-                                            <p:strVal val="#ppt_y"/>
-                                          </p:val>
-                                        </p:tav>
-                                      </p:tavLst>
-                                    </p:anim>
-                                  </p:childTnLst>
-                                </p:cTn>
-                              </p:par>
-                            </p:childTnLst>
-                          </p:cTn>
-                        </p:par>
-                        <p:par>
-                          <p:cTn id="25" fill="hold">
-                            <p:stCondLst>
-                              <p:cond delay="1000"/>
-                            </p:stCondLst>
-                            <p:childTnLst>
-                              <p:par>
-                                <p:cTn id="26" presetID="2" presetClass="entr" presetSubtype="4" fill="hold" nodeType="afterEffect">
-                                  <p:stCondLst>
-                                    <p:cond delay="0"/>
-                                  </p:stCondLst>
-                                  <p:childTnLst>
-                                    <p:set>
-                                      <p:cBhvr>
-                                        <p:cTn id="27" dur="1" fill="hold">
-                                          <p:stCondLst>
-                                            <p:cond delay="0"/>
-                                          </p:stCondLst>
-                                        </p:cTn>
-                                        <p:tgtEl>
-                                          <p:spTgt spid="10"/>
-                                        </p:tgtEl>
-                                        <p:attrNameLst>
-                                          <p:attrName>style.visibility</p:attrName>
-                                        </p:attrNameLst>
-                                      </p:cBhvr>
-                                      <p:to>
-                                        <p:strVal val="visible"/>
-                                      </p:to>
-                                    </p:set>
-                                    <p:anim calcmode="lin" valueType="num">
-                                      <p:cBhvr additive="base">
-                                        <p:cTn id="28" dur="500" fill="hold"/>
-                                        <p:tgtEl>
-                                          <p:spTgt spid="10"/>
-                                        </p:tgtEl>
-                                        <p:attrNameLst>
-                                          <p:attrName>ppt_x</p:attrName>
-                                        </p:attrNameLst>
-                                      </p:cBhvr>
-                                      <p:tavLst>
-                                        <p:tav tm="0">
-                                          <p:val>
-                                            <p:strVal val="#ppt_x"/>
-                                          </p:val>
-                                        </p:tav>
-                                        <p:tav tm="100000">
-                                          <p:val>
-                                            <p:strVal val="#ppt_x"/>
-                                          </p:val>
-                                        </p:tav>
-                                      </p:tavLst>
-                                    </p:anim>
-                                    <p:anim calcmode="lin" valueType="num">
-                                      <p:cBhvr additive="base">
-                                        <p:cTn id="29" dur="500" fill="hold"/>
-                                        <p:tgtEl>
-                                          <p:spTgt spid="10"/>
                                         </p:tgtEl>
                                         <p:attrNameLst>
                                           <p:attrName>ppt_y</p:attrName>
@@ -16269,7 +16690,7 @@
                 <a:latin typeface="Times New Roman" panose="02020603050405020304" pitchFamily="18" charset="0"/>
                 <a:cs typeface="Times New Roman" panose="02020603050405020304" pitchFamily="18" charset="0"/>
               </a:rPr>
-              <a:t>in less than a minute</a:t>
+              <a:t>in less than a 10 Minute </a:t>
             </a:r>
             <a:endParaRPr lang="en-IN" sz="2500" b="1" i="0" dirty="0">
               <a:solidFill>
@@ -16340,71 +16761,469 @@
             </a:endParaRPr>
           </a:p>
           <a:p>
+            <a:pPr marL="365760" lvl="1" indent="0">
+              <a:lnSpc>
+                <a:spcPct val="150000"/>
+              </a:lnSpc>
+              <a:buNone/>
+            </a:pPr>
+            <a:r>
+              <a:rPr lang="en-US" sz="2200" dirty="0">
+                <a:latin typeface="Times New Roman" panose="02020603050405020304" pitchFamily="18" charset="0"/>
+                <a:cs typeface="Times New Roman" panose="02020603050405020304" pitchFamily="18" charset="0"/>
+              </a:rPr>
+              <a:t>				</a:t>
+            </a:r>
+          </a:p>
+        </p:txBody>
+      </p:sp>
+      <p:sp>
+        <p:nvSpPr>
+          <p:cNvPr id="3" name="Rectangle 2">
+            <a:extLst>
+              <a:ext uri="{FF2B5EF4-FFF2-40B4-BE49-F238E27FC236}">
+                <a16:creationId xmlns:a16="http://schemas.microsoft.com/office/drawing/2014/main" id="{9565EB9E-FE3A-9BA3-3DEA-C952BACD5855}"/>
+              </a:ext>
+            </a:extLst>
+          </p:cNvPr>
+          <p:cNvSpPr/>
+          <p:nvPr/>
+        </p:nvSpPr>
+        <p:spPr>
+          <a:xfrm>
+            <a:off x="0" y="4594820"/>
+            <a:ext cx="2681880" cy="436765"/>
+          </a:xfrm>
+          <a:prstGeom prst="rect">
+            <a:avLst/>
+          </a:prstGeom>
+        </p:spPr>
+        <p:style>
+          <a:lnRef idx="2">
+            <a:schemeClr val="accent1">
+              <a:shade val="50000"/>
+            </a:schemeClr>
+          </a:lnRef>
+          <a:fillRef idx="1">
+            <a:schemeClr val="accent1"/>
+          </a:fillRef>
+          <a:effectRef idx="0">
+            <a:schemeClr val="accent1"/>
+          </a:effectRef>
+          <a:fontRef idx="minor">
+            <a:schemeClr val="lt1"/>
+          </a:fontRef>
+        </p:style>
+        <p:txBody>
+          <a:bodyPr rtlCol="0" anchor="ctr"/>
+          <a:lstStyle/>
+          <a:p>
+            <a:pPr algn="ctr"/>
+            <a:r>
+              <a:rPr lang="en-US" dirty="0"/>
+              <a:t>Features of Grow green</a:t>
+            </a:r>
+            <a:endParaRPr lang="en-IN" dirty="0"/>
+          </a:p>
+        </p:txBody>
+      </p:sp>
+      <p:sp>
+        <p:nvSpPr>
+          <p:cNvPr id="7" name="Rectangle 6">
+            <a:extLst>
+              <a:ext uri="{FF2B5EF4-FFF2-40B4-BE49-F238E27FC236}">
+                <a16:creationId xmlns:a16="http://schemas.microsoft.com/office/drawing/2014/main" id="{6D96177E-DB30-AFEC-A7FB-E277B65A7BF5}"/>
+              </a:ext>
+            </a:extLst>
+          </p:cNvPr>
+          <p:cNvSpPr/>
+          <p:nvPr/>
+        </p:nvSpPr>
+        <p:spPr>
+          <a:xfrm>
+            <a:off x="3969365" y="3272043"/>
+            <a:ext cx="4566044" cy="526872"/>
+          </a:xfrm>
+          <a:prstGeom prst="rect">
+            <a:avLst/>
+          </a:prstGeom>
+        </p:spPr>
+        <p:style>
+          <a:lnRef idx="2">
+            <a:schemeClr val="accent1">
+              <a:shade val="50000"/>
+            </a:schemeClr>
+          </a:lnRef>
+          <a:fillRef idx="1">
+            <a:schemeClr val="accent1"/>
+          </a:fillRef>
+          <a:effectRef idx="0">
+            <a:schemeClr val="accent1"/>
+          </a:effectRef>
+          <a:fontRef idx="minor">
+            <a:schemeClr val="lt1"/>
+          </a:fontRef>
+        </p:style>
+        <p:txBody>
+          <a:bodyPr rtlCol="0" anchor="ctr"/>
+          <a:lstStyle/>
+          <a:p>
+            <a:pPr algn="ctr"/>
+            <a:r>
+              <a:rPr lang="en-US" sz="1800" dirty="0">
+                <a:latin typeface="Times New Roman" panose="02020603050405020304" pitchFamily="18" charset="0"/>
+                <a:cs typeface="Times New Roman" panose="02020603050405020304" pitchFamily="18" charset="0"/>
+              </a:rPr>
+              <a:t>User can plant a tree without any money.</a:t>
+            </a:r>
+          </a:p>
+          <a:p>
+            <a:pPr algn="ctr"/>
+            <a:endParaRPr lang="en-IN" dirty="0"/>
+          </a:p>
+        </p:txBody>
+      </p:sp>
+      <p:sp>
+        <p:nvSpPr>
+          <p:cNvPr id="8" name="Rectangle 7">
+            <a:extLst>
+              <a:ext uri="{FF2B5EF4-FFF2-40B4-BE49-F238E27FC236}">
+                <a16:creationId xmlns:a16="http://schemas.microsoft.com/office/drawing/2014/main" id="{8328A351-60DF-CE75-B696-EFD03838D219}"/>
+              </a:ext>
+            </a:extLst>
+          </p:cNvPr>
+          <p:cNvSpPr/>
+          <p:nvPr/>
+        </p:nvSpPr>
+        <p:spPr>
+          <a:xfrm>
+            <a:off x="3969365" y="5257800"/>
+            <a:ext cx="4607424" cy="589756"/>
+          </a:xfrm>
+          <a:prstGeom prst="rect">
+            <a:avLst/>
+          </a:prstGeom>
+        </p:spPr>
+        <p:style>
+          <a:lnRef idx="2">
+            <a:schemeClr val="accent1">
+              <a:shade val="50000"/>
+            </a:schemeClr>
+          </a:lnRef>
+          <a:fillRef idx="1">
+            <a:schemeClr val="accent1"/>
+          </a:fillRef>
+          <a:effectRef idx="0">
+            <a:schemeClr val="accent1"/>
+          </a:effectRef>
+          <a:fontRef idx="minor">
+            <a:schemeClr val="lt1"/>
+          </a:fontRef>
+        </p:style>
+        <p:txBody>
+          <a:bodyPr rtlCol="0" anchor="ctr"/>
+          <a:lstStyle/>
+          <a:p>
             <a:pPr lvl="1">
               <a:lnSpc>
                 <a:spcPct val="150000"/>
               </a:lnSpc>
-              <a:buFont typeface="Wingdings" panose="05000000000000000000" pitchFamily="2" charset="2"/>
-              <a:buChar char="Ø"/>
             </a:pPr>
             <a:r>
-              <a:rPr lang="en-US" sz="2200" dirty="0">
+              <a:rPr lang="en-US" sz="1800" dirty="0">
                 <a:latin typeface="Times New Roman" panose="02020603050405020304" pitchFamily="18" charset="0"/>
                 <a:cs typeface="Times New Roman" panose="02020603050405020304" pitchFamily="18" charset="0"/>
               </a:rPr>
-              <a:t>	1)User can plant a tree without any money.</a:t>
-            </a:r>
-          </a:p>
+              <a:t>Those who don’t have the time can donate.</a:t>
+            </a:r>
+          </a:p>
+          <a:p>
+            <a:pPr algn="ctr"/>
+            <a:endParaRPr lang="en-IN" dirty="0"/>
+          </a:p>
+        </p:txBody>
+      </p:sp>
+      <p:sp>
+        <p:nvSpPr>
+          <p:cNvPr id="10" name="Rectangle 9">
+            <a:extLst>
+              <a:ext uri="{FF2B5EF4-FFF2-40B4-BE49-F238E27FC236}">
+                <a16:creationId xmlns:a16="http://schemas.microsoft.com/office/drawing/2014/main" id="{56109577-F236-49C5-5963-B34F90226545}"/>
+              </a:ext>
+            </a:extLst>
+          </p:cNvPr>
+          <p:cNvSpPr/>
+          <p:nvPr/>
+        </p:nvSpPr>
+        <p:spPr>
+          <a:xfrm>
+            <a:off x="3977682" y="4218499"/>
+            <a:ext cx="4598701" cy="589756"/>
+          </a:xfrm>
+          <a:prstGeom prst="rect">
+            <a:avLst/>
+          </a:prstGeom>
+        </p:spPr>
+        <p:style>
+          <a:lnRef idx="2">
+            <a:schemeClr val="accent1">
+              <a:shade val="50000"/>
+            </a:schemeClr>
+          </a:lnRef>
+          <a:fillRef idx="1">
+            <a:schemeClr val="accent1"/>
+          </a:fillRef>
+          <a:effectRef idx="0">
+            <a:schemeClr val="accent1"/>
+          </a:effectRef>
+          <a:fontRef idx="minor">
+            <a:schemeClr val="lt1"/>
+          </a:fontRef>
+        </p:style>
+        <p:txBody>
+          <a:bodyPr rtlCol="0" anchor="ctr"/>
+          <a:lstStyle/>
           <a:p>
             <a:pPr lvl="1">
               <a:lnSpc>
                 <a:spcPct val="150000"/>
               </a:lnSpc>
-              <a:buFont typeface="Wingdings" panose="05000000000000000000" pitchFamily="2" charset="2"/>
-              <a:buChar char="Ø"/>
             </a:pPr>
             <a:r>
-              <a:rPr lang="en-US" sz="2200" dirty="0">
+              <a:rPr lang="en-US" sz="1800" dirty="0">
                 <a:latin typeface="Times New Roman" panose="02020603050405020304" pitchFamily="18" charset="0"/>
                 <a:cs typeface="Times New Roman" panose="02020603050405020304" pitchFamily="18" charset="0"/>
               </a:rPr>
-              <a:t>	2)Those who don’t have the time can donate.</a:t>
-            </a:r>
-          </a:p>
-          <a:p>
-            <a:pPr lvl="1">
-              <a:lnSpc>
-                <a:spcPct val="150000"/>
-              </a:lnSpc>
-              <a:buFont typeface="Wingdings" panose="05000000000000000000" pitchFamily="2" charset="2"/>
-              <a:buChar char="Ø"/>
-            </a:pPr>
-            <a:r>
-              <a:rPr lang="en-US" sz="2200" dirty="0">
+              <a:t>Users can call our team to plant a tree.</a:t>
+            </a:r>
+          </a:p>
+          <a:p>
+            <a:pPr algn="ctr"/>
+            <a:endParaRPr lang="en-IN" dirty="0"/>
+          </a:p>
+        </p:txBody>
+      </p:sp>
+      <p:sp>
+        <p:nvSpPr>
+          <p:cNvPr id="11" name="Rectangle 10">
+            <a:extLst>
+              <a:ext uri="{FF2B5EF4-FFF2-40B4-BE49-F238E27FC236}">
+                <a16:creationId xmlns:a16="http://schemas.microsoft.com/office/drawing/2014/main" id="{E2085F91-BA35-7663-E14A-6F62629E5F69}"/>
+              </a:ext>
+            </a:extLst>
+          </p:cNvPr>
+          <p:cNvSpPr/>
+          <p:nvPr/>
+        </p:nvSpPr>
+        <p:spPr>
+          <a:xfrm>
+            <a:off x="3977682" y="6143267"/>
+            <a:ext cx="4598701" cy="589756"/>
+          </a:xfrm>
+          <a:prstGeom prst="rect">
+            <a:avLst/>
+          </a:prstGeom>
+        </p:spPr>
+        <p:style>
+          <a:lnRef idx="2">
+            <a:schemeClr val="accent1">
+              <a:shade val="50000"/>
+            </a:schemeClr>
+          </a:lnRef>
+          <a:fillRef idx="1">
+            <a:schemeClr val="accent1"/>
+          </a:fillRef>
+          <a:effectRef idx="0">
+            <a:schemeClr val="accent1"/>
+          </a:effectRef>
+          <a:fontRef idx="minor">
+            <a:schemeClr val="lt1"/>
+          </a:fontRef>
+        </p:style>
+        <p:txBody>
+          <a:bodyPr rtlCol="0" anchor="ctr"/>
+          <a:lstStyle/>
+          <a:p>
+            <a:pPr algn="ctr"/>
+            <a:r>
+              <a:rPr lang="en-US" sz="1800" dirty="0">
                 <a:latin typeface="Times New Roman" panose="02020603050405020304" pitchFamily="18" charset="0"/>
                 <a:cs typeface="Times New Roman" panose="02020603050405020304" pitchFamily="18" charset="0"/>
               </a:rPr>
-              <a:t>	3) Users can call our team to plant a tree.</a:t>
-            </a:r>
-          </a:p>
-          <a:p>
-            <a:pPr lvl="1">
-              <a:lnSpc>
-                <a:spcPct val="150000"/>
-              </a:lnSpc>
-              <a:buFont typeface="Wingdings" panose="05000000000000000000" pitchFamily="2" charset="2"/>
-              <a:buChar char="Ø"/>
-            </a:pPr>
-            <a:r>
-              <a:rPr lang="en-US" sz="2200" dirty="0">
-                <a:latin typeface="Times New Roman" panose="02020603050405020304" pitchFamily="18" charset="0"/>
-                <a:cs typeface="Times New Roman" panose="02020603050405020304" pitchFamily="18" charset="0"/>
-              </a:rPr>
-              <a:t>	4)visit grow_green.org for more information.</a:t>
-            </a:r>
-          </a:p>
-        </p:txBody>
-      </p:sp>
+              <a:t>visit grow_green.org for more information.</a:t>
+            </a:r>
+            <a:endParaRPr lang="en-IN" dirty="0"/>
+          </a:p>
+        </p:txBody>
+      </p:sp>
+      <p:cxnSp>
+        <p:nvCxnSpPr>
+          <p:cNvPr id="12" name="Straight Arrow Connector 11">
+            <a:extLst>
+              <a:ext uri="{FF2B5EF4-FFF2-40B4-BE49-F238E27FC236}">
+                <a16:creationId xmlns:a16="http://schemas.microsoft.com/office/drawing/2014/main" id="{EA3A5282-ED8F-38C5-6B11-3560D810C2C6}"/>
+              </a:ext>
+            </a:extLst>
+          </p:cNvPr>
+          <p:cNvCxnSpPr>
+            <a:stCxn id="3" idx="3"/>
+          </p:cNvCxnSpPr>
+          <p:nvPr/>
+        </p:nvCxnSpPr>
+        <p:spPr>
+          <a:xfrm flipV="1">
+            <a:off x="2681880" y="3501110"/>
+            <a:ext cx="1264564" cy="1312093"/>
+          </a:xfrm>
+          <a:prstGeom prst="straightConnector1">
+            <a:avLst/>
+          </a:prstGeom>
+          <a:ln>
+            <a:tailEnd type="triangle"/>
+          </a:ln>
+        </p:spPr>
+        <p:style>
+          <a:lnRef idx="1">
+            <a:schemeClr val="accent1"/>
+          </a:lnRef>
+          <a:fillRef idx="0">
+            <a:schemeClr val="accent1"/>
+          </a:fillRef>
+          <a:effectRef idx="0">
+            <a:schemeClr val="accent1"/>
+          </a:effectRef>
+          <a:fontRef idx="minor">
+            <a:schemeClr val="tx1"/>
+          </a:fontRef>
+        </p:style>
+      </p:cxnSp>
+      <p:cxnSp>
+        <p:nvCxnSpPr>
+          <p:cNvPr id="13" name="Straight Arrow Connector 12">
+            <a:extLst>
+              <a:ext uri="{FF2B5EF4-FFF2-40B4-BE49-F238E27FC236}">
+                <a16:creationId xmlns:a16="http://schemas.microsoft.com/office/drawing/2014/main" id="{D302E269-6721-533C-50FA-CA1B34791CF7}"/>
+              </a:ext>
+            </a:extLst>
+          </p:cNvPr>
+          <p:cNvCxnSpPr>
+            <a:cxnSpLocks/>
+            <a:stCxn id="3" idx="3"/>
+            <a:endCxn id="10" idx="1"/>
+          </p:cNvCxnSpPr>
+          <p:nvPr/>
+        </p:nvCxnSpPr>
+        <p:spPr>
+          <a:xfrm flipV="1">
+            <a:off x="2681880" y="4513377"/>
+            <a:ext cx="1295802" cy="299826"/>
+          </a:xfrm>
+          <a:prstGeom prst="straightConnector1">
+            <a:avLst/>
+          </a:prstGeom>
+          <a:ln>
+            <a:tailEnd type="triangle"/>
+          </a:ln>
+        </p:spPr>
+        <p:style>
+          <a:lnRef idx="1">
+            <a:schemeClr val="accent1"/>
+          </a:lnRef>
+          <a:fillRef idx="0">
+            <a:schemeClr val="accent1"/>
+          </a:fillRef>
+          <a:effectRef idx="0">
+            <a:schemeClr val="accent1"/>
+          </a:effectRef>
+          <a:fontRef idx="minor">
+            <a:schemeClr val="tx1"/>
+          </a:fontRef>
+        </p:style>
+      </p:cxnSp>
+      <p:cxnSp>
+        <p:nvCxnSpPr>
+          <p:cNvPr id="16" name="Straight Arrow Connector 15">
+            <a:extLst>
+              <a:ext uri="{FF2B5EF4-FFF2-40B4-BE49-F238E27FC236}">
+                <a16:creationId xmlns:a16="http://schemas.microsoft.com/office/drawing/2014/main" id="{9BC220E1-7F19-F34D-2223-34E8E57A04F7}"/>
+              </a:ext>
+            </a:extLst>
+          </p:cNvPr>
+          <p:cNvCxnSpPr>
+            <a:cxnSpLocks/>
+            <a:stCxn id="3" idx="3"/>
+          </p:cNvCxnSpPr>
+          <p:nvPr/>
+        </p:nvCxnSpPr>
+        <p:spPr>
+          <a:xfrm>
+            <a:off x="2681880" y="4813203"/>
+            <a:ext cx="1264564" cy="657555"/>
+          </a:xfrm>
+          <a:prstGeom prst="straightConnector1">
+            <a:avLst/>
+          </a:prstGeom>
+          <a:ln>
+            <a:tailEnd type="triangle"/>
+          </a:ln>
+        </p:spPr>
+        <p:style>
+          <a:lnRef idx="1">
+            <a:schemeClr val="accent1"/>
+          </a:lnRef>
+          <a:fillRef idx="0">
+            <a:schemeClr val="accent1"/>
+          </a:fillRef>
+          <a:effectRef idx="0">
+            <a:schemeClr val="accent1"/>
+          </a:effectRef>
+          <a:fontRef idx="minor">
+            <a:schemeClr val="tx1"/>
+          </a:fontRef>
+        </p:style>
+      </p:cxnSp>
+      <p:cxnSp>
+        <p:nvCxnSpPr>
+          <p:cNvPr id="19" name="Straight Arrow Connector 18">
+            <a:extLst>
+              <a:ext uri="{FF2B5EF4-FFF2-40B4-BE49-F238E27FC236}">
+                <a16:creationId xmlns:a16="http://schemas.microsoft.com/office/drawing/2014/main" id="{830DD465-5EEC-E548-4E8F-A53B84D48A05}"/>
+              </a:ext>
+            </a:extLst>
+          </p:cNvPr>
+          <p:cNvCxnSpPr>
+            <a:cxnSpLocks/>
+            <a:endCxn id="11" idx="1"/>
+          </p:cNvCxnSpPr>
+          <p:nvPr/>
+        </p:nvCxnSpPr>
+        <p:spPr>
+          <a:xfrm>
+            <a:off x="2681880" y="4852397"/>
+            <a:ext cx="1295802" cy="1585748"/>
+          </a:xfrm>
+          <a:prstGeom prst="straightConnector1">
+            <a:avLst/>
+          </a:prstGeom>
+          <a:ln>
+            <a:tailEnd type="triangle"/>
+          </a:ln>
+        </p:spPr>
+        <p:style>
+          <a:lnRef idx="1">
+            <a:schemeClr val="accent1"/>
+          </a:lnRef>
+          <a:fillRef idx="0">
+            <a:schemeClr val="accent1"/>
+          </a:fillRef>
+          <a:effectRef idx="0">
+            <a:schemeClr val="accent1"/>
+          </a:effectRef>
+          <a:fontRef idx="minor">
+            <a:schemeClr val="tx1"/>
+          </a:fontRef>
+        </p:style>
+      </p:cxnSp>
     </p:spTree>
     <p:extLst>
       <p:ext uri="{BB962C8B-B14F-4D97-AF65-F5344CB8AC3E}">
@@ -16748,7 +17567,7 @@
                             </p:stCondLst>
                             <p:childTnLst>
                               <p:par>
-                                <p:cTn id="23" presetID="2" presetClass="entr" presetSubtype="8" fill="hold" nodeType="clickEffect">
+                                <p:cTn id="23" presetID="2" presetClass="entr" presetSubtype="8" fill="hold" grpId="0" nodeType="clickEffect">
                                   <p:stCondLst>
                                     <p:cond delay="0"/>
                                   </p:stCondLst>
@@ -16761,11 +17580,7 @@
                                           </p:stCondLst>
                                         </p:cTn>
                                         <p:tgtEl>
-                                          <p:spTgt spid="6">
-                                            <p:txEl>
-                                              <p:pRg st="4" end="4"/>
-                                            </p:txEl>
-                                          </p:spTgt>
+                                          <p:spTgt spid="3"/>
                                         </p:tgtEl>
                                         <p:attrNameLst>
                                           <p:attrName>style.visibility</p:attrName>
@@ -16779,11 +17594,7 @@
                                       <p:cBhvr additive="base">
                                         <p:cTn id="25" dur="500" fill="hold"/>
                                         <p:tgtEl>
-                                          <p:spTgt spid="6">
-                                            <p:txEl>
-                                              <p:pRg st="4" end="4"/>
-                                            </p:txEl>
-                                          </p:spTgt>
+                                          <p:spTgt spid="3"/>
                                         </p:tgtEl>
                                         <p:attrNameLst>
                                           <p:attrName>ppt_x</p:attrName>
@@ -16806,11 +17617,7 @@
                                       <p:cBhvr additive="base">
                                         <p:cTn id="26" dur="500" fill="hold"/>
                                         <p:tgtEl>
-                                          <p:spTgt spid="6">
-                                            <p:txEl>
-                                              <p:pRg st="4" end="4"/>
-                                            </p:txEl>
-                                          </p:spTgt>
+                                          <p:spTgt spid="3"/>
                                         </p:tgtEl>
                                         <p:attrNameLst>
                                           <p:attrName>ppt_y</p:attrName>
@@ -16851,7 +17658,7 @@
                             </p:stCondLst>
                             <p:childTnLst>
                               <p:par>
-                                <p:cTn id="29" presetID="2" presetClass="entr" presetSubtype="8" fill="hold" nodeType="clickEffect">
+                                <p:cTn id="29" presetID="22" presetClass="entr" presetSubtype="4" fill="hold" nodeType="clickEffect">
                                   <p:stCondLst>
                                     <p:cond delay="0"/>
                                   </p:stCondLst>
@@ -16864,11 +17671,7 @@
                                           </p:stCondLst>
                                         </p:cTn>
                                         <p:tgtEl>
-                                          <p:spTgt spid="6">
-                                            <p:txEl>
-                                              <p:pRg st="5" end="5"/>
-                                            </p:txEl>
-                                          </p:spTgt>
+                                          <p:spTgt spid="12"/>
                                         </p:tgtEl>
                                         <p:attrNameLst>
                                           <p:attrName>style.visibility</p:attrName>
@@ -16878,60 +17681,58 @@
                                         <p:strVal val="visible"/>
                                       </p:to>
                                     </p:set>
-                                    <p:anim calcmode="lin" valueType="num">
-                                      <p:cBhvr additive="base">
-                                        <p:cTn id="31" dur="500" fill="hold"/>
+                                    <p:animEffect transition="in" filter="wipe(down)">
+                                      <p:cBhvr>
+                                        <p:cTn id="31" dur="500"/>
                                         <p:tgtEl>
-                                          <p:spTgt spid="6">
-                                            <p:txEl>
-                                              <p:pRg st="5" end="5"/>
-                                            </p:txEl>
-                                          </p:spTgt>
+                                          <p:spTgt spid="12"/>
+                                        </p:tgtEl>
+                                      </p:cBhvr>
+                                    </p:animEffect>
+                                  </p:childTnLst>
+                                </p:cTn>
+                              </p:par>
+                            </p:childTnLst>
+                          </p:cTn>
+                        </p:par>
+                        <p:par>
+                          <p:cTn id="32" fill="hold">
+                            <p:stCondLst>
+                              <p:cond delay="500"/>
+                            </p:stCondLst>
+                            <p:childTnLst>
+                              <p:par>
+                                <p:cTn id="33" presetID="22" presetClass="entr" presetSubtype="8" fill="hold" grpId="0" nodeType="afterEffect">
+                                  <p:stCondLst>
+                                    <p:cond delay="0"/>
+                                  </p:stCondLst>
+                                  <p:childTnLst>
+                                    <p:set>
+                                      <p:cBhvr>
+                                        <p:cTn id="34" dur="1" fill="hold">
+                                          <p:stCondLst>
+                                            <p:cond delay="0"/>
+                                          </p:stCondLst>
+                                        </p:cTn>
+                                        <p:tgtEl>
+                                          <p:spTgt spid="7"/>
                                         </p:tgtEl>
                                         <p:attrNameLst>
-                                          <p:attrName>ppt_x</p:attrName>
+                                          <p:attrName>style.visibility</p:attrName>
                                         </p:attrNameLst>
                                       </p:cBhvr>
-                                      <p:tavLst>
-                                        <p:tav tm="0">
-                                          <p:val>
-                                            <p:strVal val="0-#ppt_w/2"/>
-                                          </p:val>
-                                        </p:tav>
-                                        <p:tav tm="100000">
-                                          <p:val>
-                                            <p:strVal val="#ppt_x"/>
-                                          </p:val>
-                                        </p:tav>
-                                      </p:tavLst>
-                                    </p:anim>
-                                    <p:anim calcmode="lin" valueType="num">
-                                      <p:cBhvr additive="base">
-                                        <p:cTn id="32" dur="500" fill="hold"/>
+                                      <p:to>
+                                        <p:strVal val="visible"/>
+                                      </p:to>
+                                    </p:set>
+                                    <p:animEffect transition="in" filter="wipe(left)">
+                                      <p:cBhvr>
+                                        <p:cTn id="35" dur="500"/>
                                         <p:tgtEl>
-                                          <p:spTgt spid="6">
-                                            <p:txEl>
-                                              <p:pRg st="5" end="5"/>
-                                            </p:txEl>
-                                          </p:spTgt>
+                                          <p:spTgt spid="7"/>
                                         </p:tgtEl>
-                                        <p:attrNameLst>
-                                          <p:attrName>ppt_y</p:attrName>
-                                        </p:attrNameLst>
                                       </p:cBhvr>
-                                      <p:tavLst>
-                                        <p:tav tm="0">
-                                          <p:val>
-                                            <p:strVal val="#ppt_y"/>
-                                          </p:val>
-                                        </p:tav>
-                                        <p:tav tm="100000">
-                                          <p:val>
-                                            <p:strVal val="#ppt_y"/>
-                                          </p:val>
-                                        </p:tav>
-                                      </p:tavLst>
-                                    </p:anim>
+                                    </p:animEffect>
                                   </p:childTnLst>
                                 </p:cTn>
                               </p:par>
@@ -16942,36 +17743,32 @@
                     </p:cTn>
                   </p:par>
                   <p:par>
-                    <p:cTn id="33" fill="hold">
+                    <p:cTn id="36" fill="hold">
                       <p:stCondLst>
                         <p:cond delay="indefinite"/>
                       </p:stCondLst>
                       <p:childTnLst>
                         <p:par>
-                          <p:cTn id="34" fill="hold">
+                          <p:cTn id="37" fill="hold">
                             <p:stCondLst>
                               <p:cond delay="0"/>
                             </p:stCondLst>
                             <p:childTnLst>
                               <p:par>
-                                <p:cTn id="35" presetID="2" presetClass="entr" presetSubtype="8" fill="hold" nodeType="clickEffect">
+                                <p:cTn id="38" presetID="22" presetClass="entr" presetSubtype="4" fill="hold" nodeType="clickEffect">
                                   <p:stCondLst>
                                     <p:cond delay="0"/>
                                   </p:stCondLst>
                                   <p:childTnLst>
                                     <p:set>
                                       <p:cBhvr>
-                                        <p:cTn id="36" dur="1" fill="hold">
+                                        <p:cTn id="39" dur="1" fill="hold">
                                           <p:stCondLst>
                                             <p:cond delay="0"/>
                                           </p:stCondLst>
                                         </p:cTn>
                                         <p:tgtEl>
-                                          <p:spTgt spid="6">
-                                            <p:txEl>
-                                              <p:pRg st="6" end="6"/>
-                                            </p:txEl>
-                                          </p:spTgt>
+                                          <p:spTgt spid="13"/>
                                         </p:tgtEl>
                                         <p:attrNameLst>
                                           <p:attrName>style.visibility</p:attrName>
@@ -16981,60 +17778,58 @@
                                         <p:strVal val="visible"/>
                                       </p:to>
                                     </p:set>
-                                    <p:anim calcmode="lin" valueType="num">
-                                      <p:cBhvr additive="base">
-                                        <p:cTn id="37" dur="500" fill="hold"/>
+                                    <p:animEffect transition="in" filter="wipe(down)">
+                                      <p:cBhvr>
+                                        <p:cTn id="40" dur="500"/>
                                         <p:tgtEl>
-                                          <p:spTgt spid="6">
-                                            <p:txEl>
-                                              <p:pRg st="6" end="6"/>
-                                            </p:txEl>
-                                          </p:spTgt>
+                                          <p:spTgt spid="13"/>
+                                        </p:tgtEl>
+                                      </p:cBhvr>
+                                    </p:animEffect>
+                                  </p:childTnLst>
+                                </p:cTn>
+                              </p:par>
+                            </p:childTnLst>
+                          </p:cTn>
+                        </p:par>
+                        <p:par>
+                          <p:cTn id="41" fill="hold">
+                            <p:stCondLst>
+                              <p:cond delay="500"/>
+                            </p:stCondLst>
+                            <p:childTnLst>
+                              <p:par>
+                                <p:cTn id="42" presetID="22" presetClass="entr" presetSubtype="8" fill="hold" grpId="0" nodeType="afterEffect">
+                                  <p:stCondLst>
+                                    <p:cond delay="0"/>
+                                  </p:stCondLst>
+                                  <p:childTnLst>
+                                    <p:set>
+                                      <p:cBhvr>
+                                        <p:cTn id="43" dur="1" fill="hold">
+                                          <p:stCondLst>
+                                            <p:cond delay="0"/>
+                                          </p:stCondLst>
+                                        </p:cTn>
+                                        <p:tgtEl>
+                                          <p:spTgt spid="10"/>
                                         </p:tgtEl>
                                         <p:attrNameLst>
-                                          <p:attrName>ppt_x</p:attrName>
+                                          <p:attrName>style.visibility</p:attrName>
                                         </p:attrNameLst>
                                       </p:cBhvr>
-                                      <p:tavLst>
-                                        <p:tav tm="0">
-                                          <p:val>
-                                            <p:strVal val="0-#ppt_w/2"/>
-                                          </p:val>
-                                        </p:tav>
-                                        <p:tav tm="100000">
-                                          <p:val>
-                                            <p:strVal val="#ppt_x"/>
-                                          </p:val>
-                                        </p:tav>
-                                      </p:tavLst>
-                                    </p:anim>
-                                    <p:anim calcmode="lin" valueType="num">
-                                      <p:cBhvr additive="base">
-                                        <p:cTn id="38" dur="500" fill="hold"/>
+                                      <p:to>
+                                        <p:strVal val="visible"/>
+                                      </p:to>
+                                    </p:set>
+                                    <p:animEffect transition="in" filter="wipe(left)">
+                                      <p:cBhvr>
+                                        <p:cTn id="44" dur="500"/>
                                         <p:tgtEl>
-                                          <p:spTgt spid="6">
-                                            <p:txEl>
-                                              <p:pRg st="6" end="6"/>
-                                            </p:txEl>
-                                          </p:spTgt>
+                                          <p:spTgt spid="10"/>
                                         </p:tgtEl>
-                                        <p:attrNameLst>
-                                          <p:attrName>ppt_y</p:attrName>
-                                        </p:attrNameLst>
                                       </p:cBhvr>
-                                      <p:tavLst>
-                                        <p:tav tm="0">
-                                          <p:val>
-                                            <p:strVal val="#ppt_y"/>
-                                          </p:val>
-                                        </p:tav>
-                                        <p:tav tm="100000">
-                                          <p:val>
-                                            <p:strVal val="#ppt_y"/>
-                                          </p:val>
-                                        </p:tav>
-                                      </p:tavLst>
-                                    </p:anim>
+                                    </p:animEffect>
                                   </p:childTnLst>
                                 </p:cTn>
                               </p:par>
@@ -17045,36 +17840,32 @@
                     </p:cTn>
                   </p:par>
                   <p:par>
-                    <p:cTn id="39" fill="hold">
+                    <p:cTn id="45" fill="hold">
                       <p:stCondLst>
                         <p:cond delay="indefinite"/>
                       </p:stCondLst>
                       <p:childTnLst>
                         <p:par>
-                          <p:cTn id="40" fill="hold">
+                          <p:cTn id="46" fill="hold">
                             <p:stCondLst>
                               <p:cond delay="0"/>
                             </p:stCondLst>
                             <p:childTnLst>
                               <p:par>
-                                <p:cTn id="41" presetID="2" presetClass="entr" presetSubtype="8" fill="hold" nodeType="clickEffect">
+                                <p:cTn id="47" presetID="22" presetClass="entr" presetSubtype="8" fill="hold" nodeType="clickEffect">
                                   <p:stCondLst>
                                     <p:cond delay="0"/>
                                   </p:stCondLst>
                                   <p:childTnLst>
                                     <p:set>
                                       <p:cBhvr>
-                                        <p:cTn id="42" dur="1" fill="hold">
+                                        <p:cTn id="48" dur="1" fill="hold">
                                           <p:stCondLst>
                                             <p:cond delay="0"/>
                                           </p:stCondLst>
                                         </p:cTn>
                                         <p:tgtEl>
-                                          <p:spTgt spid="6">
-                                            <p:txEl>
-                                              <p:pRg st="7" end="7"/>
-                                            </p:txEl>
-                                          </p:spTgt>
+                                          <p:spTgt spid="16"/>
                                         </p:tgtEl>
                                         <p:attrNameLst>
                                           <p:attrName>style.visibility</p:attrName>
@@ -17084,60 +17875,155 @@
                                         <p:strVal val="visible"/>
                                       </p:to>
                                     </p:set>
-                                    <p:anim calcmode="lin" valueType="num">
-                                      <p:cBhvr additive="base">
-                                        <p:cTn id="43" dur="500" fill="hold"/>
+                                    <p:animEffect transition="in" filter="wipe(left)">
+                                      <p:cBhvr>
+                                        <p:cTn id="49" dur="500"/>
                                         <p:tgtEl>
-                                          <p:spTgt spid="6">
-                                            <p:txEl>
-                                              <p:pRg st="7" end="7"/>
-                                            </p:txEl>
-                                          </p:spTgt>
+                                          <p:spTgt spid="16"/>
+                                        </p:tgtEl>
+                                      </p:cBhvr>
+                                    </p:animEffect>
+                                  </p:childTnLst>
+                                </p:cTn>
+                              </p:par>
+                            </p:childTnLst>
+                          </p:cTn>
+                        </p:par>
+                        <p:par>
+                          <p:cTn id="50" fill="hold">
+                            <p:stCondLst>
+                              <p:cond delay="500"/>
+                            </p:stCondLst>
+                            <p:childTnLst>
+                              <p:par>
+                                <p:cTn id="51" presetID="22" presetClass="entr" presetSubtype="8" fill="hold" grpId="0" nodeType="afterEffect">
+                                  <p:stCondLst>
+                                    <p:cond delay="0"/>
+                                  </p:stCondLst>
+                                  <p:childTnLst>
+                                    <p:set>
+                                      <p:cBhvr>
+                                        <p:cTn id="52" dur="1" fill="hold">
+                                          <p:stCondLst>
+                                            <p:cond delay="0"/>
+                                          </p:stCondLst>
+                                        </p:cTn>
+                                        <p:tgtEl>
+                                          <p:spTgt spid="8"/>
                                         </p:tgtEl>
                                         <p:attrNameLst>
-                                          <p:attrName>ppt_x</p:attrName>
+                                          <p:attrName>style.visibility</p:attrName>
                                         </p:attrNameLst>
                                       </p:cBhvr>
-                                      <p:tavLst>
-                                        <p:tav tm="0">
-                                          <p:val>
-                                            <p:strVal val="0-#ppt_w/2"/>
-                                          </p:val>
-                                        </p:tav>
-                                        <p:tav tm="100000">
-                                          <p:val>
-                                            <p:strVal val="#ppt_x"/>
-                                          </p:val>
-                                        </p:tav>
-                                      </p:tavLst>
-                                    </p:anim>
-                                    <p:anim calcmode="lin" valueType="num">
-                                      <p:cBhvr additive="base">
-                                        <p:cTn id="44" dur="500" fill="hold"/>
+                                      <p:to>
+                                        <p:strVal val="visible"/>
+                                      </p:to>
+                                    </p:set>
+                                    <p:animEffect transition="in" filter="wipe(left)">
+                                      <p:cBhvr>
+                                        <p:cTn id="53" dur="500"/>
                                         <p:tgtEl>
-                                          <p:spTgt spid="6">
-                                            <p:txEl>
-                                              <p:pRg st="7" end="7"/>
-                                            </p:txEl>
-                                          </p:spTgt>
+                                          <p:spTgt spid="8"/>
+                                        </p:tgtEl>
+                                      </p:cBhvr>
+                                    </p:animEffect>
+                                  </p:childTnLst>
+                                </p:cTn>
+                              </p:par>
+                            </p:childTnLst>
+                          </p:cTn>
+                        </p:par>
+                      </p:childTnLst>
+                    </p:cTn>
+                  </p:par>
+                  <p:par>
+                    <p:cTn id="54" fill="hold">
+                      <p:stCondLst>
+                        <p:cond delay="indefinite"/>
+                      </p:stCondLst>
+                      <p:childTnLst>
+                        <p:par>
+                          <p:cTn id="55" fill="hold">
+                            <p:stCondLst>
+                              <p:cond delay="0"/>
+                            </p:stCondLst>
+                            <p:childTnLst>
+                              <p:par>
+                                <p:cTn id="56" presetID="22" presetClass="entr" presetSubtype="8" fill="hold" nodeType="clickEffect">
+                                  <p:stCondLst>
+                                    <p:cond delay="0"/>
+                                  </p:stCondLst>
+                                  <p:childTnLst>
+                                    <p:set>
+                                      <p:cBhvr>
+                                        <p:cTn id="57" dur="1" fill="hold">
+                                          <p:stCondLst>
+                                            <p:cond delay="0"/>
+                                          </p:stCondLst>
+                                        </p:cTn>
+                                        <p:tgtEl>
+                                          <p:spTgt spid="19"/>
                                         </p:tgtEl>
                                         <p:attrNameLst>
-                                          <p:attrName>ppt_y</p:attrName>
+                                          <p:attrName>style.visibility</p:attrName>
                                         </p:attrNameLst>
                                       </p:cBhvr>
-                                      <p:tavLst>
-                                        <p:tav tm="0">
-                                          <p:val>
-                                            <p:strVal val="#ppt_y"/>
-                                          </p:val>
-                                        </p:tav>
-                                        <p:tav tm="100000">
-                                          <p:val>
-                                            <p:strVal val="#ppt_y"/>
-                                          </p:val>
-                                        </p:tav>
-                                      </p:tavLst>
-                                    </p:anim>
+                                      <p:to>
+                                        <p:strVal val="visible"/>
+                                      </p:to>
+                                    </p:set>
+                                    <p:animEffect transition="in" filter="wipe(left)">
+                                      <p:cBhvr>
+                                        <p:cTn id="58" dur="500"/>
+                                        <p:tgtEl>
+                                          <p:spTgt spid="19"/>
+                                        </p:tgtEl>
+                                      </p:cBhvr>
+                                    </p:animEffect>
+                                  </p:childTnLst>
+                                </p:cTn>
+                              </p:par>
+                            </p:childTnLst>
+                          </p:cTn>
+                        </p:par>
+                        <p:par>
+                          <p:cTn id="59" fill="hold">
+                            <p:stCondLst>
+                              <p:cond delay="500"/>
+                            </p:stCondLst>
+                            <p:childTnLst>
+                              <p:par>
+                                <p:cTn id="60" presetID="22" presetClass="entr" presetSubtype="8" fill="hold" grpId="0" nodeType="afterEffect">
+                                  <p:stCondLst>
+                                    <p:cond delay="0"/>
+                                  </p:stCondLst>
+                                  <p:childTnLst>
+                                    <p:set>
+                                      <p:cBhvr>
+                                        <p:cTn id="61" dur="1" fill="hold">
+                                          <p:stCondLst>
+                                            <p:cond delay="0"/>
+                                          </p:stCondLst>
+                                        </p:cTn>
+                                        <p:tgtEl>
+                                          <p:spTgt spid="11"/>
+                                        </p:tgtEl>
+                                        <p:attrNameLst>
+                                          <p:attrName>style.visibility</p:attrName>
+                                        </p:attrNameLst>
+                                      </p:cBhvr>
+                                      <p:to>
+                                        <p:strVal val="visible"/>
+                                      </p:to>
+                                    </p:set>
+                                    <p:animEffect transition="in" filter="wipe(left)">
+                                      <p:cBhvr>
+                                        <p:cTn id="62" dur="500"/>
+                                        <p:tgtEl>
+                                          <p:spTgt spid="11"/>
+                                        </p:tgtEl>
+                                      </p:cBhvr>
+                                    </p:animEffect>
                                   </p:childTnLst>
                                 </p:cTn>
                               </p:par>
@@ -17168,6 +18054,13 @@
         </p:cTn>
       </p:par>
     </p:tnLst>
+    <p:bldLst>
+      <p:bldP spid="3" grpId="0" animBg="1"/>
+      <p:bldP spid="7" grpId="0" animBg="1"/>
+      <p:bldP spid="8" grpId="0" animBg="1"/>
+      <p:bldP spid="10" grpId="0" animBg="1"/>
+      <p:bldP spid="11" grpId="0" animBg="1"/>
+    </p:bldLst>
   </p:timing>
 </p:sld>
 </file>

</xml_diff>